<commit_message>
(Hopefully) the final version
</commit_message>
<xml_diff>
--- a/Presentation.pptx
+++ b/Presentation.pptx
@@ -5,16 +5,27 @@
     <p:sldMasterId id="2147483648" r:id="rId1"/>
   </p:sldMasterIdLst>
   <p:handoutMasterIdLst>
-    <p:handoutMasterId r:id="rId9"/>
+    <p:handoutMasterId r:id="rId20"/>
   </p:handoutMasterIdLst>
   <p:sldIdLst>
     <p:sldId id="256" r:id="rId2"/>
     <p:sldId id="257" r:id="rId3"/>
     <p:sldId id="258" r:id="rId4"/>
     <p:sldId id="259" r:id="rId5"/>
-    <p:sldId id="261" r:id="rId6"/>
-    <p:sldId id="262" r:id="rId7"/>
-    <p:sldId id="263" r:id="rId8"/>
+    <p:sldId id="272" r:id="rId6"/>
+    <p:sldId id="273" r:id="rId7"/>
+    <p:sldId id="277" r:id="rId8"/>
+    <p:sldId id="263" r:id="rId9"/>
+    <p:sldId id="274" r:id="rId10"/>
+    <p:sldId id="275" r:id="rId11"/>
+    <p:sldId id="276" r:id="rId12"/>
+    <p:sldId id="266" r:id="rId13"/>
+    <p:sldId id="267" r:id="rId14"/>
+    <p:sldId id="269" r:id="rId15"/>
+    <p:sldId id="270" r:id="rId16"/>
+    <p:sldId id="264" r:id="rId17"/>
+    <p:sldId id="271" r:id="rId18"/>
+    <p:sldId id="265" r:id="rId19"/>
   </p:sldIdLst>
   <p:sldSz cx="12192000" cy="6858000"/>
   <p:notesSz cx="7010400" cy="9296400"/>
@@ -180,7 +191,7 @@
             </a:lvl1pPr>
           </a:lstStyle>
           <a:p>
-            <a:endParaRPr lang="en-US"/>
+            <a:endParaRPr lang="en-US" dirty="0"/>
           </a:p>
         </p:txBody>
       </p:sp>
@@ -219,9 +230,9 @@
           <a:p>
             <a:fld id="{3CF7F9E4-3780-4D43-A3C2-4336D1E02782}" type="datetimeFigureOut">
               <a:rPr lang="en-US" smtClean="0"/>
-              <a:t>1/18/2018</a:t>
+              <a:t>1/19/2018</a:t>
             </a:fld>
-            <a:endParaRPr lang="en-US"/>
+            <a:endParaRPr lang="en-US" dirty="0"/>
           </a:p>
         </p:txBody>
       </p:sp>
@@ -258,7 +269,7 @@
             </a:lvl1pPr>
           </a:lstStyle>
           <a:p>
-            <a:endParaRPr lang="en-US"/>
+            <a:endParaRPr lang="en-US" dirty="0"/>
           </a:p>
         </p:txBody>
       </p:sp>
@@ -299,7 +310,7 @@
               <a:rPr lang="en-US" smtClean="0"/>
               <a:t>‹#›</a:t>
             </a:fld>
-            <a:endParaRPr lang="en-US"/>
+            <a:endParaRPr lang="en-US" dirty="0"/>
           </a:p>
         </p:txBody>
       </p:sp>
@@ -484,7 +495,7 @@
           <a:p>
             <a:fld id="{48A87A34-81AB-432B-8DAE-1953F412C126}" type="datetimeFigureOut">
               <a:rPr lang="en-US" dirty="0"/>
-              <a:t>1/18/2018</a:t>
+              <a:t>1/19/2018</a:t>
             </a:fld>
             <a:endParaRPr lang="en-US" dirty="0"/>
           </a:p>
@@ -745,7 +756,7 @@
           <a:p>
             <a:fld id="{48A87A34-81AB-432B-8DAE-1953F412C126}" type="datetimeFigureOut">
               <a:rPr lang="en-US" dirty="0"/>
-              <a:t>1/18/2018</a:t>
+              <a:t>1/19/2018</a:t>
             </a:fld>
             <a:endParaRPr lang="en-US" dirty="0"/>
           </a:p>
@@ -972,7 +983,7 @@
             <a:fld id="{48A87A34-81AB-432B-8DAE-1953F412C126}" type="datetimeFigureOut">
               <a:rPr lang="en-US" dirty="0"/>
               <a:pPr/>
-              <a:t>1/18/2018</a:t>
+              <a:t>1/19/2018</a:t>
             </a:fld>
             <a:endParaRPr lang="en-US" dirty="0"/>
           </a:p>
@@ -1278,7 +1289,7 @@
             <a:fld id="{48A87A34-81AB-432B-8DAE-1953F412C126}" type="datetimeFigureOut">
               <a:rPr lang="en-US" dirty="0"/>
               <a:pPr/>
-              <a:t>1/18/2018</a:t>
+              <a:t>1/19/2018</a:t>
             </a:fld>
             <a:endParaRPr lang="en-US" dirty="0"/>
           </a:p>
@@ -1747,7 +1758,7 @@
             <a:fld id="{48A87A34-81AB-432B-8DAE-1953F412C126}" type="datetimeFigureOut">
               <a:rPr lang="en-US" dirty="0"/>
               <a:pPr/>
-              <a:t>1/18/2018</a:t>
+              <a:t>1/19/2018</a:t>
             </a:fld>
             <a:endParaRPr lang="en-US" dirty="0"/>
           </a:p>
@@ -2289,7 +2300,7 @@
           <a:p>
             <a:fld id="{48A87A34-81AB-432B-8DAE-1953F412C126}" type="datetimeFigureOut">
               <a:rPr lang="en-US" dirty="0"/>
-              <a:t>1/18/2018</a:t>
+              <a:t>1/19/2018</a:t>
             </a:fld>
             <a:endParaRPr lang="en-US" dirty="0"/>
           </a:p>
@@ -3055,7 +3066,7 @@
           <a:p>
             <a:fld id="{48A87A34-81AB-432B-8DAE-1953F412C126}" type="datetimeFigureOut">
               <a:rPr lang="en-US" dirty="0"/>
-              <a:t>1/18/2018</a:t>
+              <a:t>1/19/2018</a:t>
             </a:fld>
             <a:endParaRPr lang="en-US" dirty="0"/>
           </a:p>
@@ -3225,7 +3236,7 @@
           <a:p>
             <a:fld id="{48A87A34-81AB-432B-8DAE-1953F412C126}" type="datetimeFigureOut">
               <a:rPr lang="en-US" dirty="0"/>
-              <a:t>1/18/2018</a:t>
+              <a:t>1/19/2018</a:t>
             </a:fld>
             <a:endParaRPr lang="en-US" dirty="0"/>
           </a:p>
@@ -3444,7 +3455,7 @@
             <a:fld id="{48A87A34-81AB-432B-8DAE-1953F412C126}" type="datetimeFigureOut">
               <a:rPr lang="en-US" dirty="0"/>
               <a:pPr/>
-              <a:t>1/18/2018</a:t>
+              <a:t>1/19/2018</a:t>
             </a:fld>
             <a:endParaRPr lang="en-US" dirty="0"/>
           </a:p>
@@ -3619,7 +3630,7 @@
           <a:p>
             <a:fld id="{48A87A34-81AB-432B-8DAE-1953F412C126}" type="datetimeFigureOut">
               <a:rPr lang="en-US" dirty="0"/>
-              <a:t>1/18/2018</a:t>
+              <a:t>1/19/2018</a:t>
             </a:fld>
             <a:endParaRPr lang="en-US" dirty="0"/>
           </a:p>
@@ -3904,7 +3915,7 @@
             <a:fld id="{48A87A34-81AB-432B-8DAE-1953F412C126}" type="datetimeFigureOut">
               <a:rPr lang="en-US" dirty="0"/>
               <a:pPr/>
-              <a:t>1/18/2018</a:t>
+              <a:t>1/19/2018</a:t>
             </a:fld>
             <a:endParaRPr lang="en-US" dirty="0"/>
           </a:p>
@@ -4141,7 +4152,7 @@
           <a:p>
             <a:fld id="{48A87A34-81AB-432B-8DAE-1953F412C126}" type="datetimeFigureOut">
               <a:rPr lang="en-US" dirty="0"/>
-              <a:t>1/18/2018</a:t>
+              <a:t>1/19/2018</a:t>
             </a:fld>
             <a:endParaRPr lang="en-US" dirty="0"/>
           </a:p>
@@ -4515,7 +4526,7 @@
           <a:p>
             <a:fld id="{48A87A34-81AB-432B-8DAE-1953F412C126}" type="datetimeFigureOut">
               <a:rPr lang="en-US" dirty="0"/>
-              <a:t>1/18/2018</a:t>
+              <a:t>1/19/2018</a:t>
             </a:fld>
             <a:endParaRPr lang="en-US" dirty="0"/>
           </a:p>
@@ -4628,7 +4639,7 @@
           <a:p>
             <a:fld id="{48A87A34-81AB-432B-8DAE-1953F412C126}" type="datetimeFigureOut">
               <a:rPr lang="en-US" dirty="0"/>
-              <a:t>1/18/2018</a:t>
+              <a:t>1/19/2018</a:t>
             </a:fld>
             <a:endParaRPr lang="en-US" dirty="0"/>
           </a:p>
@@ -4718,7 +4729,7 @@
           <a:p>
             <a:fld id="{48A87A34-81AB-432B-8DAE-1953F412C126}" type="datetimeFigureOut">
               <a:rPr lang="en-US" dirty="0"/>
-              <a:t>1/18/2018</a:t>
+              <a:t>1/19/2018</a:t>
             </a:fld>
             <a:endParaRPr lang="en-US" dirty="0"/>
           </a:p>
@@ -4962,7 +4973,7 @@
           <a:p>
             <a:fld id="{48A87A34-81AB-432B-8DAE-1953F412C126}" type="datetimeFigureOut">
               <a:rPr lang="en-US" dirty="0"/>
-              <a:t>1/18/2018</a:t>
+              <a:t>1/19/2018</a:t>
             </a:fld>
             <a:endParaRPr lang="en-US" dirty="0"/>
           </a:p>
@@ -5213,7 +5224,7 @@
           <a:p>
             <a:fld id="{48A87A34-81AB-432B-8DAE-1953F412C126}" type="datetimeFigureOut">
               <a:rPr lang="en-US" dirty="0"/>
-              <a:t>1/18/2018</a:t>
+              <a:t>1/19/2018</a:t>
             </a:fld>
             <a:endParaRPr lang="en-US" dirty="0"/>
           </a:p>
@@ -5452,7 +5463,7 @@
             <a:fld id="{48A87A34-81AB-432B-8DAE-1953F412C126}" type="datetimeFigureOut">
               <a:rPr lang="en-US" dirty="0"/>
               <a:pPr/>
-              <a:t>1/18/2018</a:t>
+              <a:t>1/19/2018</a:t>
             </a:fld>
             <a:endParaRPr lang="en-US" dirty="0"/>
           </a:p>
@@ -5885,7 +5896,7 @@
             <a:pPr algn="ctr"/>
             <a:r>
               <a:rPr lang="en-US" sz="3600" dirty="0"/>
-              <a:t>SFPD Activities trends</a:t>
+              <a:t>Analysis of crime in san francisco</a:t>
             </a:r>
             <a:br>
               <a:rPr lang="en-US" sz="3600" dirty="0"/>
@@ -5941,6 +5952,1241 @@
     <p:extLst>
       <p:ext uri="{BB962C8B-B14F-4D97-AF65-F5344CB8AC3E}">
         <p14:creationId xmlns:p14="http://schemas.microsoft.com/office/powerpoint/2010/main" val="2337711178"/>
+      </p:ext>
+    </p:extLst>
+  </p:cSld>
+  <p:clrMapOvr>
+    <a:masterClrMapping/>
+  </p:clrMapOvr>
+</p:sld>
+</file>
+
+<file path=ppt/slides/slide10.xml><?xml version="1.0" encoding="utf-8"?>
+<p:sld xmlns:a="http://schemas.openxmlformats.org/drawingml/2006/main" xmlns:r="http://schemas.openxmlformats.org/officeDocument/2006/relationships" xmlns:p="http://schemas.openxmlformats.org/presentationml/2006/main">
+  <p:cSld>
+    <p:spTree>
+      <p:nvGrpSpPr>
+        <p:cNvPr id="1" name=""/>
+        <p:cNvGrpSpPr/>
+        <p:nvPr/>
+      </p:nvGrpSpPr>
+      <p:grpSpPr>
+        <a:xfrm>
+          <a:off x="0" y="0"/>
+          <a:ext cx="0" cy="0"/>
+          <a:chOff x="0" y="0"/>
+          <a:chExt cx="0" cy="0"/>
+        </a:xfrm>
+      </p:grpSpPr>
+      <p:pic>
+        <p:nvPicPr>
+          <p:cNvPr id="3" name="Picture 2">
+            <a:extLst>
+              <a:ext uri="{FF2B5EF4-FFF2-40B4-BE49-F238E27FC236}">
+                <a16:creationId xmlns:a16="http://schemas.microsoft.com/office/drawing/2014/main" id="{5E8B4D21-AA02-4066-8D8A-E0502D374BFA}"/>
+              </a:ext>
+            </a:extLst>
+          </p:cNvPr>
+          <p:cNvPicPr>
+            <a:picLocks noChangeAspect="1"/>
+          </p:cNvPicPr>
+          <p:nvPr/>
+        </p:nvPicPr>
+        <p:blipFill>
+          <a:blip r:embed="rId2"/>
+          <a:stretch>
+            <a:fillRect/>
+          </a:stretch>
+        </p:blipFill>
+        <p:spPr>
+          <a:xfrm>
+            <a:off x="0" y="1623059"/>
+            <a:ext cx="8267023" cy="4240531"/>
+          </a:xfrm>
+          <a:prstGeom prst="rect">
+            <a:avLst/>
+          </a:prstGeom>
+        </p:spPr>
+      </p:pic>
+      <p:pic>
+        <p:nvPicPr>
+          <p:cNvPr id="5" name="Picture 4">
+            <a:extLst>
+              <a:ext uri="{FF2B5EF4-FFF2-40B4-BE49-F238E27FC236}">
+                <a16:creationId xmlns:a16="http://schemas.microsoft.com/office/drawing/2014/main" id="{F01E403F-A9C4-4472-9C96-D21BB8FE6D34}"/>
+              </a:ext>
+            </a:extLst>
+          </p:cNvPr>
+          <p:cNvPicPr>
+            <a:picLocks noChangeAspect="1"/>
+          </p:cNvPicPr>
+          <p:nvPr/>
+        </p:nvPicPr>
+        <p:blipFill>
+          <a:blip r:embed="rId3"/>
+          <a:stretch>
+            <a:fillRect/>
+          </a:stretch>
+        </p:blipFill>
+        <p:spPr>
+          <a:xfrm>
+            <a:off x="8766746" y="2635209"/>
+            <a:ext cx="2476627" cy="1587582"/>
+          </a:xfrm>
+          <a:prstGeom prst="rect">
+            <a:avLst/>
+          </a:prstGeom>
+        </p:spPr>
+      </p:pic>
+      <p:sp>
+        <p:nvSpPr>
+          <p:cNvPr id="6" name="Title 1">
+            <a:extLst>
+              <a:ext uri="{FF2B5EF4-FFF2-40B4-BE49-F238E27FC236}">
+                <a16:creationId xmlns:a16="http://schemas.microsoft.com/office/drawing/2014/main" id="{52D93DB8-8B59-4F77-9B27-4403F61C07E5}"/>
+              </a:ext>
+            </a:extLst>
+          </p:cNvPr>
+          <p:cNvSpPr txBox="1">
+            <a:spLocks/>
+          </p:cNvSpPr>
+          <p:nvPr/>
+        </p:nvSpPr>
+        <p:spPr>
+          <a:xfrm>
+            <a:off x="2895600" y="764373"/>
+            <a:ext cx="8610600" cy="1293028"/>
+          </a:xfrm>
+          <a:prstGeom prst="rect">
+            <a:avLst/>
+          </a:prstGeom>
+        </p:spPr>
+        <p:txBody>
+          <a:bodyPr/>
+          <a:lstStyle>
+            <a:lvl1pPr algn="r" defTabSz="914400" rtl="0" eaLnBrk="1" latinLnBrk="0" hangingPunct="1">
+              <a:lnSpc>
+                <a:spcPct val="90000"/>
+              </a:lnSpc>
+              <a:spcBef>
+                <a:spcPct val="0"/>
+              </a:spcBef>
+              <a:buNone/>
+              <a:defRPr sz="4000" kern="1200" cap="all" baseline="0">
+                <a:solidFill>
+                  <a:schemeClr val="tx1"/>
+                </a:solidFill>
+                <a:latin typeface="+mj-lt"/>
+                <a:ea typeface="+mj-ea"/>
+                <a:cs typeface="+mj-cs"/>
+              </a:defRPr>
+            </a:lvl1pPr>
+          </a:lstStyle>
+          <a:p>
+            <a:r>
+              <a:rPr lang="en-US" sz="3200" dirty="0"/>
+              <a:t>Incident mix on days of week</a:t>
+            </a:r>
+          </a:p>
+        </p:txBody>
+      </p:sp>
+    </p:spTree>
+    <p:extLst>
+      <p:ext uri="{BB962C8B-B14F-4D97-AF65-F5344CB8AC3E}">
+        <p14:creationId xmlns:p14="http://schemas.microsoft.com/office/powerpoint/2010/main" val="4272679688"/>
+      </p:ext>
+    </p:extLst>
+  </p:cSld>
+  <p:clrMapOvr>
+    <a:masterClrMapping/>
+  </p:clrMapOvr>
+</p:sld>
+</file>
+
+<file path=ppt/slides/slide11.xml><?xml version="1.0" encoding="utf-8"?>
+<p:sld xmlns:a="http://schemas.openxmlformats.org/drawingml/2006/main" xmlns:r="http://schemas.openxmlformats.org/officeDocument/2006/relationships" xmlns:p="http://schemas.openxmlformats.org/presentationml/2006/main">
+  <p:cSld>
+    <p:spTree>
+      <p:nvGrpSpPr>
+        <p:cNvPr id="1" name=""/>
+        <p:cNvGrpSpPr/>
+        <p:nvPr/>
+      </p:nvGrpSpPr>
+      <p:grpSpPr>
+        <a:xfrm>
+          <a:off x="0" y="0"/>
+          <a:ext cx="0" cy="0"/>
+          <a:chOff x="0" y="0"/>
+          <a:chExt cx="0" cy="0"/>
+        </a:xfrm>
+      </p:grpSpPr>
+      <p:pic>
+        <p:nvPicPr>
+          <p:cNvPr id="3" name="Picture 2">
+            <a:extLst>
+              <a:ext uri="{FF2B5EF4-FFF2-40B4-BE49-F238E27FC236}">
+                <a16:creationId xmlns:a16="http://schemas.microsoft.com/office/drawing/2014/main" id="{D3EB0C84-32EE-46EA-B8ED-B6C10E3E9813}"/>
+              </a:ext>
+            </a:extLst>
+          </p:cNvPr>
+          <p:cNvPicPr>
+            <a:picLocks noChangeAspect="1"/>
+          </p:cNvPicPr>
+          <p:nvPr/>
+        </p:nvPicPr>
+        <p:blipFill>
+          <a:blip r:embed="rId2"/>
+          <a:stretch>
+            <a:fillRect/>
+          </a:stretch>
+        </p:blipFill>
+        <p:spPr>
+          <a:xfrm>
+            <a:off x="115372" y="1421088"/>
+            <a:ext cx="11367823" cy="2407962"/>
+          </a:xfrm>
+          <a:prstGeom prst="rect">
+            <a:avLst/>
+          </a:prstGeom>
+        </p:spPr>
+      </p:pic>
+      <p:pic>
+        <p:nvPicPr>
+          <p:cNvPr id="5" name="Picture 4">
+            <a:extLst>
+              <a:ext uri="{FF2B5EF4-FFF2-40B4-BE49-F238E27FC236}">
+                <a16:creationId xmlns:a16="http://schemas.microsoft.com/office/drawing/2014/main" id="{98C07C5C-62A2-4B52-AC1A-43E7F94BB64D}"/>
+              </a:ext>
+            </a:extLst>
+          </p:cNvPr>
+          <p:cNvPicPr>
+            <a:picLocks noChangeAspect="1"/>
+          </p:cNvPicPr>
+          <p:nvPr/>
+        </p:nvPicPr>
+        <p:blipFill>
+          <a:blip r:embed="rId3"/>
+          <a:stretch>
+            <a:fillRect/>
+          </a:stretch>
+        </p:blipFill>
+        <p:spPr>
+          <a:xfrm>
+            <a:off x="115372" y="3935793"/>
+            <a:ext cx="11402258" cy="2842198"/>
+          </a:xfrm>
+          <a:prstGeom prst="rect">
+            <a:avLst/>
+          </a:prstGeom>
+        </p:spPr>
+      </p:pic>
+      <p:sp>
+        <p:nvSpPr>
+          <p:cNvPr id="6" name="Title 1">
+            <a:extLst>
+              <a:ext uri="{FF2B5EF4-FFF2-40B4-BE49-F238E27FC236}">
+                <a16:creationId xmlns:a16="http://schemas.microsoft.com/office/drawing/2014/main" id="{2C835F9E-13EF-4A9D-860E-89313C7B471E}"/>
+              </a:ext>
+            </a:extLst>
+          </p:cNvPr>
+          <p:cNvSpPr txBox="1">
+            <a:spLocks/>
+          </p:cNvSpPr>
+          <p:nvPr/>
+        </p:nvSpPr>
+        <p:spPr>
+          <a:xfrm>
+            <a:off x="2895600" y="764373"/>
+            <a:ext cx="8610600" cy="1293028"/>
+          </a:xfrm>
+          <a:prstGeom prst="rect">
+            <a:avLst/>
+          </a:prstGeom>
+        </p:spPr>
+        <p:txBody>
+          <a:bodyPr/>
+          <a:lstStyle>
+            <a:lvl1pPr algn="r" defTabSz="914400" rtl="0" eaLnBrk="1" latinLnBrk="0" hangingPunct="1">
+              <a:lnSpc>
+                <a:spcPct val="90000"/>
+              </a:lnSpc>
+              <a:spcBef>
+                <a:spcPct val="0"/>
+              </a:spcBef>
+              <a:buNone/>
+              <a:defRPr sz="4000" kern="1200" cap="all" baseline="0">
+                <a:solidFill>
+                  <a:schemeClr val="tx1"/>
+                </a:solidFill>
+                <a:latin typeface="+mj-lt"/>
+                <a:ea typeface="+mj-ea"/>
+                <a:cs typeface="+mj-cs"/>
+              </a:defRPr>
+            </a:lvl1pPr>
+          </a:lstStyle>
+          <a:p>
+            <a:r>
+              <a:rPr lang="en-US" dirty="0"/>
+              <a:t>Time of day patterns</a:t>
+            </a:r>
+          </a:p>
+        </p:txBody>
+      </p:sp>
+      <p:sp>
+        <p:nvSpPr>
+          <p:cNvPr id="7" name="TextBox 6">
+            <a:extLst>
+              <a:ext uri="{FF2B5EF4-FFF2-40B4-BE49-F238E27FC236}">
+                <a16:creationId xmlns:a16="http://schemas.microsoft.com/office/drawing/2014/main" id="{87BED7E6-FDCC-4EB6-99F6-1A70CA4AFFE9}"/>
+              </a:ext>
+            </a:extLst>
+          </p:cNvPr>
+          <p:cNvSpPr txBox="1"/>
+          <p:nvPr/>
+        </p:nvSpPr>
+        <p:spPr>
+          <a:xfrm>
+            <a:off x="11315700" y="2217420"/>
+            <a:ext cx="833883" cy="307777"/>
+          </a:xfrm>
+          <a:prstGeom prst="rect">
+            <a:avLst/>
+          </a:prstGeom>
+          <a:noFill/>
+        </p:spPr>
+        <p:txBody>
+          <a:bodyPr wrap="none" rtlCol="0">
+            <a:spAutoFit/>
+          </a:bodyPr>
+          <a:lstStyle/>
+          <a:p>
+            <a:r>
+              <a:rPr lang="en-US" sz="1400" b="1" dirty="0"/>
+              <a:t>Sunday</a:t>
+            </a:r>
+          </a:p>
+        </p:txBody>
+      </p:sp>
+      <p:sp>
+        <p:nvSpPr>
+          <p:cNvPr id="8" name="TextBox 7">
+            <a:extLst>
+              <a:ext uri="{FF2B5EF4-FFF2-40B4-BE49-F238E27FC236}">
+                <a16:creationId xmlns:a16="http://schemas.microsoft.com/office/drawing/2014/main" id="{36D67592-976E-452F-9B2A-B0E29EBFC30C}"/>
+              </a:ext>
+            </a:extLst>
+          </p:cNvPr>
+          <p:cNvSpPr txBox="1"/>
+          <p:nvPr/>
+        </p:nvSpPr>
+        <p:spPr>
+          <a:xfrm>
+            <a:off x="11365230" y="5078730"/>
+            <a:ext cx="670376" cy="523220"/>
+          </a:xfrm>
+          <a:prstGeom prst="rect">
+            <a:avLst/>
+          </a:prstGeom>
+          <a:noFill/>
+        </p:spPr>
+        <p:txBody>
+          <a:bodyPr wrap="none" rtlCol="0">
+            <a:spAutoFit/>
+          </a:bodyPr>
+          <a:lstStyle/>
+          <a:p>
+            <a:r>
+              <a:rPr lang="en-US" sz="1400" b="1" dirty="0"/>
+              <a:t>Other</a:t>
+            </a:r>
+          </a:p>
+          <a:p>
+            <a:r>
+              <a:rPr lang="en-US" sz="1400" b="1" dirty="0"/>
+              <a:t>Days</a:t>
+            </a:r>
+          </a:p>
+        </p:txBody>
+      </p:sp>
+    </p:spTree>
+    <p:extLst>
+      <p:ext uri="{BB962C8B-B14F-4D97-AF65-F5344CB8AC3E}">
+        <p14:creationId xmlns:p14="http://schemas.microsoft.com/office/powerpoint/2010/main" val="1057485437"/>
+      </p:ext>
+    </p:extLst>
+  </p:cSld>
+  <p:clrMapOvr>
+    <a:masterClrMapping/>
+  </p:clrMapOvr>
+</p:sld>
+</file>
+
+<file path=ppt/slides/slide12.xml><?xml version="1.0" encoding="utf-8"?>
+<p:sld xmlns:a="http://schemas.openxmlformats.org/drawingml/2006/main" xmlns:r="http://schemas.openxmlformats.org/officeDocument/2006/relationships" xmlns:p="http://schemas.openxmlformats.org/presentationml/2006/main">
+  <p:cSld>
+    <p:spTree>
+      <p:nvGrpSpPr>
+        <p:cNvPr id="1" name=""/>
+        <p:cNvGrpSpPr/>
+        <p:nvPr/>
+      </p:nvGrpSpPr>
+      <p:grpSpPr>
+        <a:xfrm>
+          <a:off x="0" y="0"/>
+          <a:ext cx="0" cy="0"/>
+          <a:chOff x="0" y="0"/>
+          <a:chExt cx="0" cy="0"/>
+        </a:xfrm>
+      </p:grpSpPr>
+      <p:sp>
+        <p:nvSpPr>
+          <p:cNvPr id="2" name="Title 1">
+            <a:extLst>
+              <a:ext uri="{FF2B5EF4-FFF2-40B4-BE49-F238E27FC236}">
+                <a16:creationId xmlns:a16="http://schemas.microsoft.com/office/drawing/2014/main" id="{DA902A31-8368-404C-8980-ED804DB4D5CD}"/>
+              </a:ext>
+            </a:extLst>
+          </p:cNvPr>
+          <p:cNvSpPr>
+            <a:spLocks noGrp="1"/>
+          </p:cNvSpPr>
+          <p:nvPr>
+            <p:ph type="title"/>
+          </p:nvPr>
+        </p:nvSpPr>
+        <p:spPr>
+          <a:xfrm>
+            <a:off x="3501390" y="570063"/>
+            <a:ext cx="8610600" cy="1293028"/>
+          </a:xfrm>
+        </p:spPr>
+        <p:txBody>
+          <a:bodyPr>
+            <a:normAutofit/>
+          </a:bodyPr>
+          <a:lstStyle/>
+          <a:p>
+            <a:r>
+              <a:rPr lang="en-US" sz="3600" dirty="0"/>
+              <a:t>Resolution Rate Analysis</a:t>
+            </a:r>
+          </a:p>
+        </p:txBody>
+      </p:sp>
+      <p:pic>
+        <p:nvPicPr>
+          <p:cNvPr id="2050" name="Picture 2" descr="https://lh6.googleusercontent.com/A7dzblst3jB1qaKPW89k78vSHC4Vuber7P3T5Yk_Xtc1ebvgtOEQF6Xl2fkrOkIxsKCndk3MSRPxM5_52-8An6LEmUGNdyEjxdbwN6wOwKLvIoemN-CIRqAJUdE7xqHEPkskrW8b9sA">
+            <a:extLst>
+              <a:ext uri="{FF2B5EF4-FFF2-40B4-BE49-F238E27FC236}">
+                <a16:creationId xmlns:a16="http://schemas.microsoft.com/office/drawing/2014/main" id="{851EEF80-CBAB-44AD-B061-1C4BB9F7DD06}"/>
+              </a:ext>
+            </a:extLst>
+          </p:cNvPr>
+          <p:cNvPicPr>
+            <a:picLocks noChangeAspect="1" noChangeArrowheads="1"/>
+          </p:cNvPicPr>
+          <p:nvPr/>
+        </p:nvPicPr>
+        <p:blipFill>
+          <a:blip r:embed="rId2">
+            <a:extLst>
+              <a:ext uri="{28A0092B-C50C-407E-A947-70E740481C1C}">
+                <a14:useLocalDpi xmlns:a14="http://schemas.microsoft.com/office/drawing/2010/main" val="0"/>
+              </a:ext>
+            </a:extLst>
+          </a:blip>
+          <a:srcRect/>
+          <a:stretch>
+            <a:fillRect/>
+          </a:stretch>
+        </p:blipFill>
+        <p:spPr bwMode="auto">
+          <a:xfrm>
+            <a:off x="21765" y="1555595"/>
+            <a:ext cx="7077075" cy="4845398"/>
+          </a:xfrm>
+          <a:prstGeom prst="rect">
+            <a:avLst/>
+          </a:prstGeom>
+          <a:noFill/>
+          <a:extLst>
+            <a:ext uri="{909E8E84-426E-40DD-AFC4-6F175D3DCCD1}">
+              <a14:hiddenFill xmlns:a14="http://schemas.microsoft.com/office/drawing/2010/main">
+                <a:solidFill>
+                  <a:srgbClr val="FFFFFF"/>
+                </a:solidFill>
+              </a14:hiddenFill>
+            </a:ext>
+          </a:extLst>
+        </p:spPr>
+      </p:pic>
+      <p:sp>
+        <p:nvSpPr>
+          <p:cNvPr id="6" name="TextBox 5">
+            <a:extLst>
+              <a:ext uri="{FF2B5EF4-FFF2-40B4-BE49-F238E27FC236}">
+                <a16:creationId xmlns:a16="http://schemas.microsoft.com/office/drawing/2014/main" id="{80455920-693C-4610-87C8-0DD778B95433}"/>
+              </a:ext>
+            </a:extLst>
+          </p:cNvPr>
+          <p:cNvSpPr txBox="1"/>
+          <p:nvPr/>
+        </p:nvSpPr>
+        <p:spPr>
+          <a:xfrm>
+            <a:off x="7098840" y="2720340"/>
+            <a:ext cx="4753637" cy="1815882"/>
+          </a:xfrm>
+          <a:prstGeom prst="rect">
+            <a:avLst/>
+          </a:prstGeom>
+          <a:noFill/>
+        </p:spPr>
+        <p:txBody>
+          <a:bodyPr wrap="square" rtlCol="0">
+            <a:spAutoFit/>
+          </a:bodyPr>
+          <a:lstStyle/>
+          <a:p>
+            <a:r>
+              <a:rPr lang="en-US" sz="1600" dirty="0"/>
+              <a:t>Resolution Rate:</a:t>
+            </a:r>
+          </a:p>
+          <a:p>
+            <a:pPr marL="285750" indent="-285750" fontAlgn="base">
+              <a:buFont typeface="Arial" panose="020B0604020202020204" pitchFamily="34" charset="0"/>
+              <a:buChar char="•"/>
+            </a:pPr>
+            <a:r>
+              <a:rPr lang="en-US" sz="1600" dirty="0"/>
+              <a:t>Proportion of the incidents of the given category that does not have a resolution status of “NONE”</a:t>
+            </a:r>
+          </a:p>
+          <a:p>
+            <a:pPr marL="285750" indent="-285750" fontAlgn="base">
+              <a:buFont typeface="Arial" panose="020B0604020202020204" pitchFamily="34" charset="0"/>
+              <a:buChar char="•"/>
+            </a:pPr>
+            <a:r>
+              <a:rPr lang="en-US" sz="1600" dirty="0"/>
+              <a:t>A non-NONE type resolution status implies that the police had followed up on the incident and given it some closure</a:t>
+            </a:r>
+          </a:p>
+        </p:txBody>
+      </p:sp>
+      <p:sp>
+        <p:nvSpPr>
+          <p:cNvPr id="7" name="TextBox 6">
+            <a:extLst>
+              <a:ext uri="{FF2B5EF4-FFF2-40B4-BE49-F238E27FC236}">
+                <a16:creationId xmlns:a16="http://schemas.microsoft.com/office/drawing/2014/main" id="{53BFBFC0-D9A4-45F7-84C5-2FD23833DEE5}"/>
+              </a:ext>
+            </a:extLst>
+          </p:cNvPr>
+          <p:cNvSpPr txBox="1"/>
+          <p:nvPr/>
+        </p:nvSpPr>
+        <p:spPr>
+          <a:xfrm>
+            <a:off x="1383840" y="6401186"/>
+            <a:ext cx="3193503" cy="369332"/>
+          </a:xfrm>
+          <a:prstGeom prst="rect">
+            <a:avLst/>
+          </a:prstGeom>
+          <a:noFill/>
+        </p:spPr>
+        <p:txBody>
+          <a:bodyPr wrap="none" rtlCol="0">
+            <a:spAutoFit/>
+          </a:bodyPr>
+          <a:lstStyle/>
+          <a:p>
+            <a:r>
+              <a:rPr lang="en-US" dirty="0"/>
+              <a:t>All possible resolution types</a:t>
+            </a:r>
+            <a:endParaRPr lang="en-US" sz="1600" dirty="0"/>
+          </a:p>
+        </p:txBody>
+      </p:sp>
+    </p:spTree>
+    <p:extLst>
+      <p:ext uri="{BB962C8B-B14F-4D97-AF65-F5344CB8AC3E}">
+        <p14:creationId xmlns:p14="http://schemas.microsoft.com/office/powerpoint/2010/main" val="1568995643"/>
+      </p:ext>
+    </p:extLst>
+  </p:cSld>
+  <p:clrMapOvr>
+    <a:masterClrMapping/>
+  </p:clrMapOvr>
+</p:sld>
+</file>
+
+<file path=ppt/slides/slide13.xml><?xml version="1.0" encoding="utf-8"?>
+<p:sld xmlns:a="http://schemas.openxmlformats.org/drawingml/2006/main" xmlns:r="http://schemas.openxmlformats.org/officeDocument/2006/relationships" xmlns:p="http://schemas.openxmlformats.org/presentationml/2006/main">
+  <p:cSld>
+    <p:spTree>
+      <p:nvGrpSpPr>
+        <p:cNvPr id="1" name=""/>
+        <p:cNvGrpSpPr/>
+        <p:nvPr/>
+      </p:nvGrpSpPr>
+      <p:grpSpPr>
+        <a:xfrm>
+          <a:off x="0" y="0"/>
+          <a:ext cx="0" cy="0"/>
+          <a:chOff x="0" y="0"/>
+          <a:chExt cx="0" cy="0"/>
+        </a:xfrm>
+      </p:grpSpPr>
+      <p:pic>
+        <p:nvPicPr>
+          <p:cNvPr id="3074" name="Picture 2" descr="https://lh4.googleusercontent.com/ioGO_iQuBR0xR0RZJ_dl6g9weWURpUBXyn3EMXxz40oHeftgDaFP1bE57j5ILiWPLICmz1QUEW46NBo0t4bz_CHHcxIY3kVubhqzd4Mdr7XsL18aUhloJ1cKOzgu6QSz4r9Ci_p09TA">
+            <a:extLst>
+              <a:ext uri="{FF2B5EF4-FFF2-40B4-BE49-F238E27FC236}">
+                <a16:creationId xmlns:a16="http://schemas.microsoft.com/office/drawing/2014/main" id="{0B9FFB53-6E70-4244-96A2-E9670DD737A9}"/>
+              </a:ext>
+            </a:extLst>
+          </p:cNvPr>
+          <p:cNvPicPr>
+            <a:picLocks noChangeAspect="1" noChangeArrowheads="1"/>
+          </p:cNvPicPr>
+          <p:nvPr/>
+        </p:nvPicPr>
+        <p:blipFill>
+          <a:blip r:embed="rId2">
+            <a:extLst>
+              <a:ext uri="{28A0092B-C50C-407E-A947-70E740481C1C}">
+                <a14:useLocalDpi xmlns:a14="http://schemas.microsoft.com/office/drawing/2010/main" val="0"/>
+              </a:ext>
+            </a:extLst>
+          </a:blip>
+          <a:srcRect/>
+          <a:stretch>
+            <a:fillRect/>
+          </a:stretch>
+        </p:blipFill>
+        <p:spPr bwMode="auto">
+          <a:xfrm>
+            <a:off x="1081088" y="1337310"/>
+            <a:ext cx="10028237" cy="5440680"/>
+          </a:xfrm>
+          <a:prstGeom prst="rect">
+            <a:avLst/>
+          </a:prstGeom>
+          <a:noFill/>
+          <a:extLst>
+            <a:ext uri="{909E8E84-426E-40DD-AFC4-6F175D3DCCD1}">
+              <a14:hiddenFill xmlns:a14="http://schemas.microsoft.com/office/drawing/2010/main">
+                <a:solidFill>
+                  <a:srgbClr val="FFFFFF"/>
+                </a:solidFill>
+              </a14:hiddenFill>
+            </a:ext>
+          </a:extLst>
+        </p:spPr>
+      </p:pic>
+    </p:spTree>
+    <p:extLst>
+      <p:ext uri="{BB962C8B-B14F-4D97-AF65-F5344CB8AC3E}">
+        <p14:creationId xmlns:p14="http://schemas.microsoft.com/office/powerpoint/2010/main" val="723557906"/>
+      </p:ext>
+    </p:extLst>
+  </p:cSld>
+  <p:clrMapOvr>
+    <a:masterClrMapping/>
+  </p:clrMapOvr>
+</p:sld>
+</file>
+
+<file path=ppt/slides/slide14.xml><?xml version="1.0" encoding="utf-8"?>
+<p:sld xmlns:a="http://schemas.openxmlformats.org/drawingml/2006/main" xmlns:r="http://schemas.openxmlformats.org/officeDocument/2006/relationships" xmlns:p="http://schemas.openxmlformats.org/presentationml/2006/main">
+  <p:cSld>
+    <p:spTree>
+      <p:nvGrpSpPr>
+        <p:cNvPr id="1" name=""/>
+        <p:cNvGrpSpPr/>
+        <p:nvPr/>
+      </p:nvGrpSpPr>
+      <p:grpSpPr>
+        <a:xfrm>
+          <a:off x="0" y="0"/>
+          <a:ext cx="0" cy="0"/>
+          <a:chOff x="0" y="0"/>
+          <a:chExt cx="0" cy="0"/>
+        </a:xfrm>
+      </p:grpSpPr>
+      <p:sp>
+        <p:nvSpPr>
+          <p:cNvPr id="3" name="Content Placeholder 2">
+            <a:extLst>
+              <a:ext uri="{FF2B5EF4-FFF2-40B4-BE49-F238E27FC236}">
+                <a16:creationId xmlns:a16="http://schemas.microsoft.com/office/drawing/2014/main" id="{F2FD608A-EDF0-4250-B4AB-F55342DBF20C}"/>
+              </a:ext>
+            </a:extLst>
+          </p:cNvPr>
+          <p:cNvSpPr>
+            <a:spLocks noGrp="1"/>
+          </p:cNvSpPr>
+          <p:nvPr>
+            <p:ph idx="1"/>
+          </p:nvPr>
+        </p:nvSpPr>
+        <p:spPr>
+          <a:xfrm>
+            <a:off x="639500" y="2136686"/>
+            <a:ext cx="10820400" cy="4024125"/>
+          </a:xfrm>
+        </p:spPr>
+        <p:txBody>
+          <a:bodyPr>
+            <a:normAutofit fontScale="92500" lnSpcReduction="20000"/>
+          </a:bodyPr>
+          <a:lstStyle/>
+          <a:p>
+            <a:pPr>
+              <a:buFont typeface="Wingdings" panose="05000000000000000000" pitchFamily="2" charset="2"/>
+              <a:buChar char="Ø"/>
+            </a:pPr>
+            <a:r>
+              <a:rPr lang="en-US" dirty="0"/>
+              <a:t>Mapped each incident’s coordinates to a zip code</a:t>
+            </a:r>
+          </a:p>
+          <a:p>
+            <a:pPr>
+              <a:buFont typeface="Wingdings" panose="05000000000000000000" pitchFamily="2" charset="2"/>
+              <a:buChar char="Ø"/>
+            </a:pPr>
+            <a:r>
+              <a:rPr lang="en-US" dirty="0"/>
+              <a:t>Used ACS data from the Census Bureau to get the economic data for each zip code</a:t>
+            </a:r>
+          </a:p>
+          <a:p>
+            <a:pPr>
+              <a:buFont typeface="Wingdings" panose="05000000000000000000" pitchFamily="2" charset="2"/>
+              <a:buChar char="Ø"/>
+            </a:pPr>
+            <a:r>
+              <a:rPr lang="en-US" dirty="0"/>
+              <a:t>Used 3 criteria for affluence level:</a:t>
+            </a:r>
+          </a:p>
+          <a:p>
+            <a:pPr lvl="1"/>
+            <a:r>
+              <a:rPr lang="en-US" dirty="0"/>
+              <a:t>Poverty rate</a:t>
+            </a:r>
+          </a:p>
+          <a:p>
+            <a:pPr lvl="1"/>
+            <a:r>
+              <a:rPr lang="en-US" dirty="0"/>
+              <a:t>Per capita income</a:t>
+            </a:r>
+          </a:p>
+          <a:p>
+            <a:pPr lvl="1"/>
+            <a:r>
+              <a:rPr lang="en-US" dirty="0"/>
+              <a:t>Median household income</a:t>
+            </a:r>
+          </a:p>
+          <a:p>
+            <a:pPr>
+              <a:buFont typeface="Wingdings" panose="05000000000000000000" pitchFamily="2" charset="2"/>
+              <a:buChar char="Ø"/>
+            </a:pPr>
+            <a:r>
+              <a:rPr lang="en-US" dirty="0"/>
+              <a:t>Incident types that showed correlation:</a:t>
+            </a:r>
+          </a:p>
+          <a:p>
+            <a:pPr lvl="1"/>
+            <a:r>
+              <a:rPr lang="en-US" dirty="0"/>
+              <a:t>Burglary</a:t>
+            </a:r>
+          </a:p>
+          <a:p>
+            <a:pPr lvl="1"/>
+            <a:r>
+              <a:rPr lang="en-US" dirty="0"/>
+              <a:t>Vehicle Theft</a:t>
+            </a:r>
+          </a:p>
+          <a:p>
+            <a:pPr lvl="1"/>
+            <a:r>
+              <a:rPr lang="en-US" dirty="0"/>
+              <a:t>Trespassing</a:t>
+            </a:r>
+          </a:p>
+          <a:p>
+            <a:pPr lvl="1"/>
+            <a:r>
+              <a:rPr lang="en-US" dirty="0"/>
+              <a:t>Assault</a:t>
+            </a:r>
+          </a:p>
+          <a:p>
+            <a:pPr lvl="1"/>
+            <a:r>
+              <a:rPr lang="en-US" dirty="0"/>
+              <a:t>Fraud</a:t>
+            </a:r>
+          </a:p>
+          <a:p>
+            <a:pPr lvl="1"/>
+            <a:r>
+              <a:rPr lang="en-US" dirty="0"/>
+              <a:t>Larceny/Theft</a:t>
+            </a:r>
+          </a:p>
+        </p:txBody>
+      </p:sp>
+      <p:sp>
+        <p:nvSpPr>
+          <p:cNvPr id="4" name="TextBox 3">
+            <a:extLst>
+              <a:ext uri="{FF2B5EF4-FFF2-40B4-BE49-F238E27FC236}">
+                <a16:creationId xmlns:a16="http://schemas.microsoft.com/office/drawing/2014/main" id="{80B4F133-4B3C-4BEC-94D2-BBBA70DBACFC}"/>
+              </a:ext>
+            </a:extLst>
+          </p:cNvPr>
+          <p:cNvSpPr txBox="1"/>
+          <p:nvPr/>
+        </p:nvSpPr>
+        <p:spPr>
+          <a:xfrm>
+            <a:off x="1623060" y="1566635"/>
+            <a:ext cx="9784080" cy="400110"/>
+          </a:xfrm>
+          <a:prstGeom prst="rect">
+            <a:avLst/>
+          </a:prstGeom>
+          <a:noFill/>
+        </p:spPr>
+        <p:txBody>
+          <a:bodyPr wrap="square" rtlCol="0">
+            <a:spAutoFit/>
+          </a:bodyPr>
+          <a:lstStyle/>
+          <a:p>
+            <a:r>
+              <a:rPr lang="en-US" sz="2000" b="1" dirty="0"/>
+              <a:t>Does SFPD pay more attention to crimes committed in more affluent areas?</a:t>
+            </a:r>
+          </a:p>
+        </p:txBody>
+      </p:sp>
+    </p:spTree>
+    <p:extLst>
+      <p:ext uri="{BB962C8B-B14F-4D97-AF65-F5344CB8AC3E}">
+        <p14:creationId xmlns:p14="http://schemas.microsoft.com/office/powerpoint/2010/main" val="3120868367"/>
+      </p:ext>
+    </p:extLst>
+  </p:cSld>
+  <p:clrMapOvr>
+    <a:masterClrMapping/>
+  </p:clrMapOvr>
+</p:sld>
+</file>
+
+<file path=ppt/slides/slide15.xml><?xml version="1.0" encoding="utf-8"?>
+<p:sld xmlns:a="http://schemas.openxmlformats.org/drawingml/2006/main" xmlns:r="http://schemas.openxmlformats.org/officeDocument/2006/relationships" xmlns:p="http://schemas.openxmlformats.org/presentationml/2006/main">
+  <p:cSld>
+    <p:spTree>
+      <p:nvGrpSpPr>
+        <p:cNvPr id="1" name=""/>
+        <p:cNvGrpSpPr/>
+        <p:nvPr/>
+      </p:nvGrpSpPr>
+      <p:grpSpPr>
+        <a:xfrm>
+          <a:off x="0" y="0"/>
+          <a:ext cx="0" cy="0"/>
+          <a:chOff x="0" y="0"/>
+          <a:chExt cx="0" cy="0"/>
+        </a:xfrm>
+      </p:grpSpPr>
+      <p:pic>
+        <p:nvPicPr>
+          <p:cNvPr id="4098" name="Picture 2" descr="https://lh4.googleusercontent.com/5rd2yFY-XM1g2Nn0BJUn2I9k7q4Y9ydcbXBr-htbht9Oa4Koj7hQ2eIrz3o1796iDg4JC_fnMZparB_ad6m46VXAJYk6FjNJWvMGlQFjlww9t6Va77U5mm0wTJIEvjRi9wrTIUWgrbU">
+            <a:extLst>
+              <a:ext uri="{FF2B5EF4-FFF2-40B4-BE49-F238E27FC236}">
+                <a16:creationId xmlns:a16="http://schemas.microsoft.com/office/drawing/2014/main" id="{C975ACAA-5236-44CC-BBC4-70A772148B43}"/>
+              </a:ext>
+            </a:extLst>
+          </p:cNvPr>
+          <p:cNvPicPr>
+            <a:picLocks noChangeAspect="1" noChangeArrowheads="1"/>
+          </p:cNvPicPr>
+          <p:nvPr/>
+        </p:nvPicPr>
+        <p:blipFill>
+          <a:blip r:embed="rId2">
+            <a:extLst>
+              <a:ext uri="{28A0092B-C50C-407E-A947-70E740481C1C}">
+                <a14:useLocalDpi xmlns:a14="http://schemas.microsoft.com/office/drawing/2010/main" val="0"/>
+              </a:ext>
+            </a:extLst>
+          </a:blip>
+          <a:srcRect/>
+          <a:stretch>
+            <a:fillRect/>
+          </a:stretch>
+        </p:blipFill>
+        <p:spPr bwMode="auto">
+          <a:xfrm>
+            <a:off x="326708" y="1428750"/>
+            <a:ext cx="11858625" cy="5429250"/>
+          </a:xfrm>
+          <a:prstGeom prst="rect">
+            <a:avLst/>
+          </a:prstGeom>
+          <a:noFill/>
+          <a:extLst>
+            <a:ext uri="{909E8E84-426E-40DD-AFC4-6F175D3DCCD1}">
+              <a14:hiddenFill xmlns:a14="http://schemas.microsoft.com/office/drawing/2010/main">
+                <a:solidFill>
+                  <a:srgbClr val="FFFFFF"/>
+                </a:solidFill>
+              </a14:hiddenFill>
+            </a:ext>
+          </a:extLst>
+        </p:spPr>
+      </p:pic>
+    </p:spTree>
+    <p:extLst>
+      <p:ext uri="{BB962C8B-B14F-4D97-AF65-F5344CB8AC3E}">
+        <p14:creationId xmlns:p14="http://schemas.microsoft.com/office/powerpoint/2010/main" val="2675253791"/>
+      </p:ext>
+    </p:extLst>
+  </p:cSld>
+  <p:clrMapOvr>
+    <a:masterClrMapping/>
+  </p:clrMapOvr>
+</p:sld>
+</file>
+
+<file path=ppt/slides/slide16.xml><?xml version="1.0" encoding="utf-8"?>
+<p:sld xmlns:a="http://schemas.openxmlformats.org/drawingml/2006/main" xmlns:r="http://schemas.openxmlformats.org/officeDocument/2006/relationships" xmlns:p="http://schemas.openxmlformats.org/presentationml/2006/main">
+  <p:cSld>
+    <p:spTree>
+      <p:nvGrpSpPr>
+        <p:cNvPr id="1" name=""/>
+        <p:cNvGrpSpPr/>
+        <p:nvPr/>
+      </p:nvGrpSpPr>
+      <p:grpSpPr>
+        <a:xfrm>
+          <a:off x="0" y="0"/>
+          <a:ext cx="0" cy="0"/>
+          <a:chOff x="0" y="0"/>
+          <a:chExt cx="0" cy="0"/>
+        </a:xfrm>
+      </p:grpSpPr>
+      <p:pic>
+        <p:nvPicPr>
+          <p:cNvPr id="1026" name="Picture 2" descr="https://lh4.googleusercontent.com/5O5IpKeGaCFYtF1aOSF8SfkyBtxN3MwW8bTByUJ5a2lAn5vZhu-9k3AUsUe2C1QcuyjMVGnmSAyItMNofk7gfW99oTS05hCVX8o5EsoiXF25LMoSBwzbjNHk1D7RS4MpVFsBaj3oYbI">
+            <a:extLst>
+              <a:ext uri="{FF2B5EF4-FFF2-40B4-BE49-F238E27FC236}">
+                <a16:creationId xmlns:a16="http://schemas.microsoft.com/office/drawing/2014/main" id="{324288A6-203D-4A5A-9A00-3B6497D49E55}"/>
+              </a:ext>
+            </a:extLst>
+          </p:cNvPr>
+          <p:cNvPicPr>
+            <a:picLocks noChangeAspect="1" noChangeArrowheads="1"/>
+          </p:cNvPicPr>
+          <p:nvPr/>
+        </p:nvPicPr>
+        <p:blipFill>
+          <a:blip r:embed="rId2">
+            <a:extLst>
+              <a:ext uri="{28A0092B-C50C-407E-A947-70E740481C1C}">
+                <a14:useLocalDpi xmlns:a14="http://schemas.microsoft.com/office/drawing/2010/main" val="0"/>
+              </a:ext>
+            </a:extLst>
+          </a:blip>
+          <a:srcRect/>
+          <a:stretch>
+            <a:fillRect/>
+          </a:stretch>
+        </p:blipFill>
+        <p:spPr bwMode="auto">
+          <a:xfrm>
+            <a:off x="0" y="1382078"/>
+            <a:ext cx="12192000" cy="5534025"/>
+          </a:xfrm>
+          <a:prstGeom prst="rect">
+            <a:avLst/>
+          </a:prstGeom>
+          <a:noFill/>
+          <a:extLst>
+            <a:ext uri="{909E8E84-426E-40DD-AFC4-6F175D3DCCD1}">
+              <a14:hiddenFill xmlns:a14="http://schemas.microsoft.com/office/drawing/2010/main">
+                <a:solidFill>
+                  <a:srgbClr val="FFFFFF"/>
+                </a:solidFill>
+              </a14:hiddenFill>
+            </a:ext>
+          </a:extLst>
+        </p:spPr>
+      </p:pic>
+    </p:spTree>
+    <p:extLst>
+      <p:ext uri="{BB962C8B-B14F-4D97-AF65-F5344CB8AC3E}">
+        <p14:creationId xmlns:p14="http://schemas.microsoft.com/office/powerpoint/2010/main" val="3903685062"/>
+      </p:ext>
+    </p:extLst>
+  </p:cSld>
+  <p:clrMapOvr>
+    <a:masterClrMapping/>
+  </p:clrMapOvr>
+</p:sld>
+</file>
+
+<file path=ppt/slides/slide17.xml><?xml version="1.0" encoding="utf-8"?>
+<p:sld xmlns:a="http://schemas.openxmlformats.org/drawingml/2006/main" xmlns:r="http://schemas.openxmlformats.org/officeDocument/2006/relationships" xmlns:p="http://schemas.openxmlformats.org/presentationml/2006/main">
+  <p:cSld>
+    <p:spTree>
+      <p:nvGrpSpPr>
+        <p:cNvPr id="1" name=""/>
+        <p:cNvGrpSpPr/>
+        <p:nvPr/>
+      </p:nvGrpSpPr>
+      <p:grpSpPr>
+        <a:xfrm>
+          <a:off x="0" y="0"/>
+          <a:ext cx="0" cy="0"/>
+          <a:chOff x="0" y="0"/>
+          <a:chExt cx="0" cy="0"/>
+        </a:xfrm>
+      </p:grpSpPr>
+      <p:sp>
+        <p:nvSpPr>
+          <p:cNvPr id="2" name="Title 1">
+            <a:extLst>
+              <a:ext uri="{FF2B5EF4-FFF2-40B4-BE49-F238E27FC236}">
+                <a16:creationId xmlns:a16="http://schemas.microsoft.com/office/drawing/2014/main" id="{FA8BCC86-6644-4ED6-A70F-6CF8B7F92601}"/>
+              </a:ext>
+            </a:extLst>
+          </p:cNvPr>
+          <p:cNvSpPr>
+            <a:spLocks noGrp="1"/>
+          </p:cNvSpPr>
+          <p:nvPr>
+            <p:ph type="title"/>
+          </p:nvPr>
+        </p:nvSpPr>
+        <p:spPr>
+          <a:xfrm>
+            <a:off x="4446270" y="1474470"/>
+            <a:ext cx="2487929" cy="1109448"/>
+          </a:xfrm>
+        </p:spPr>
+        <p:txBody>
+          <a:bodyPr/>
+          <a:lstStyle/>
+          <a:p>
+            <a:r>
+              <a:rPr lang="en-US" dirty="0"/>
+              <a:t>Q&amp;A</a:t>
+            </a:r>
+          </a:p>
+        </p:txBody>
+      </p:sp>
+    </p:spTree>
+    <p:extLst>
+      <p:ext uri="{BB962C8B-B14F-4D97-AF65-F5344CB8AC3E}">
+        <p14:creationId xmlns:p14="http://schemas.microsoft.com/office/powerpoint/2010/main" val="1986218071"/>
+      </p:ext>
+    </p:extLst>
+  </p:cSld>
+  <p:clrMapOvr>
+    <a:masterClrMapping/>
+  </p:clrMapOvr>
+</p:sld>
+</file>
+
+<file path=ppt/slides/slide18.xml><?xml version="1.0" encoding="utf-8"?>
+<p:sld xmlns:a="http://schemas.openxmlformats.org/drawingml/2006/main" xmlns:r="http://schemas.openxmlformats.org/officeDocument/2006/relationships" xmlns:p="http://schemas.openxmlformats.org/presentationml/2006/main">
+  <p:cSld>
+    <p:spTree>
+      <p:nvGrpSpPr>
+        <p:cNvPr id="1" name=""/>
+        <p:cNvGrpSpPr/>
+        <p:nvPr/>
+      </p:nvGrpSpPr>
+      <p:grpSpPr>
+        <a:xfrm>
+          <a:off x="0" y="0"/>
+          <a:ext cx="0" cy="0"/>
+          <a:chOff x="0" y="0"/>
+          <a:chExt cx="0" cy="0"/>
+        </a:xfrm>
+      </p:grpSpPr>
+      <p:pic>
+        <p:nvPicPr>
+          <p:cNvPr id="6" name="Picture 5">
+            <a:extLst>
+              <a:ext uri="{FF2B5EF4-FFF2-40B4-BE49-F238E27FC236}">
+                <a16:creationId xmlns:a16="http://schemas.microsoft.com/office/drawing/2014/main" id="{D535A1E8-5319-453D-A355-58E67306F139}"/>
+              </a:ext>
+            </a:extLst>
+          </p:cNvPr>
+          <p:cNvPicPr>
+            <a:picLocks noChangeAspect="1"/>
+          </p:cNvPicPr>
+          <p:nvPr/>
+        </p:nvPicPr>
+        <p:blipFill>
+          <a:blip r:embed="rId2"/>
+          <a:stretch>
+            <a:fillRect/>
+          </a:stretch>
+        </p:blipFill>
+        <p:spPr>
+          <a:xfrm>
+            <a:off x="2667000" y="1040130"/>
+            <a:ext cx="6858000" cy="5783580"/>
+          </a:xfrm>
+          <a:prstGeom prst="rect">
+            <a:avLst/>
+          </a:prstGeom>
+        </p:spPr>
+      </p:pic>
+      <p:sp>
+        <p:nvSpPr>
+          <p:cNvPr id="2" name="Title 1">
+            <a:extLst>
+              <a:ext uri="{FF2B5EF4-FFF2-40B4-BE49-F238E27FC236}">
+                <a16:creationId xmlns:a16="http://schemas.microsoft.com/office/drawing/2014/main" id="{8A29C2BB-823E-4AC9-A7E4-F0662DB4BA50}"/>
+              </a:ext>
+            </a:extLst>
+          </p:cNvPr>
+          <p:cNvSpPr>
+            <a:spLocks noGrp="1"/>
+          </p:cNvSpPr>
+          <p:nvPr>
+            <p:ph type="title"/>
+          </p:nvPr>
+        </p:nvSpPr>
+        <p:spPr/>
+        <p:txBody>
+          <a:bodyPr>
+            <a:normAutofit/>
+          </a:bodyPr>
+          <a:lstStyle/>
+          <a:p>
+            <a:r>
+              <a:rPr lang="en-US" sz="3200" dirty="0"/>
+              <a:t>All categories of incidents</a:t>
+            </a:r>
+            <a:br>
+              <a:rPr lang="en-US" sz="3200" dirty="0"/>
+            </a:br>
+            <a:r>
+              <a:rPr lang="en-US" sz="2400" cap="none" dirty="0"/>
+              <a:t>by Count</a:t>
+            </a:r>
+            <a:endParaRPr lang="en-US" sz="3200" cap="none" dirty="0"/>
+          </a:p>
+        </p:txBody>
+      </p:sp>
+      <p:cxnSp>
+        <p:nvCxnSpPr>
+          <p:cNvPr id="8" name="Straight Connector 7">
+            <a:extLst>
+              <a:ext uri="{FF2B5EF4-FFF2-40B4-BE49-F238E27FC236}">
+                <a16:creationId xmlns:a16="http://schemas.microsoft.com/office/drawing/2014/main" id="{B349767E-665E-4824-8C60-739BA150CD9E}"/>
+              </a:ext>
+            </a:extLst>
+          </p:cNvPr>
+          <p:cNvCxnSpPr/>
+          <p:nvPr/>
+        </p:nvCxnSpPr>
+        <p:spPr>
+          <a:xfrm flipV="1">
+            <a:off x="5326380" y="2057401"/>
+            <a:ext cx="0" cy="4549139"/>
+          </a:xfrm>
+          <a:prstGeom prst="line">
+            <a:avLst/>
+          </a:prstGeom>
+          <a:ln w="9525" cap="flat" cmpd="sng" algn="ctr">
+            <a:solidFill>
+              <a:schemeClr val="accent2"/>
+            </a:solidFill>
+            <a:prstDash val="dash"/>
+            <a:round/>
+            <a:headEnd type="none" w="med" len="med"/>
+            <a:tailEnd type="none" w="med" len="med"/>
+          </a:ln>
+        </p:spPr>
+        <p:style>
+          <a:lnRef idx="0">
+            <a:scrgbClr r="0" g="0" b="0"/>
+          </a:lnRef>
+          <a:fillRef idx="0">
+            <a:scrgbClr r="0" g="0" b="0"/>
+          </a:fillRef>
+          <a:effectRef idx="0">
+            <a:scrgbClr r="0" g="0" b="0"/>
+          </a:effectRef>
+          <a:fontRef idx="minor">
+            <a:schemeClr val="tx1"/>
+          </a:fontRef>
+        </p:style>
+      </p:cxnSp>
+      <p:sp>
+        <p:nvSpPr>
+          <p:cNvPr id="9" name="TextBox 8">
+            <a:extLst>
+              <a:ext uri="{FF2B5EF4-FFF2-40B4-BE49-F238E27FC236}">
+                <a16:creationId xmlns:a16="http://schemas.microsoft.com/office/drawing/2014/main" id="{B9B0913B-D568-4F92-AC15-9A49D915E24B}"/>
+              </a:ext>
+            </a:extLst>
+          </p:cNvPr>
+          <p:cNvSpPr txBox="1"/>
+          <p:nvPr/>
+        </p:nvSpPr>
+        <p:spPr>
+          <a:xfrm>
+            <a:off x="10984230" y="6400800"/>
+            <a:ext cx="813043" cy="369332"/>
+          </a:xfrm>
+          <a:prstGeom prst="rect">
+            <a:avLst/>
+          </a:prstGeom>
+          <a:noFill/>
+        </p:spPr>
+        <p:txBody>
+          <a:bodyPr wrap="none" rtlCol="0">
+            <a:spAutoFit/>
+          </a:bodyPr>
+          <a:lstStyle/>
+          <a:p>
+            <a:r>
+              <a:rPr lang="en-US" dirty="0">
+                <a:hlinkClick r:id="rId3" action="ppaction://hlinksldjump"/>
+              </a:rPr>
+              <a:t>BACK</a:t>
+            </a:r>
+            <a:endParaRPr lang="en-US" dirty="0"/>
+          </a:p>
+        </p:txBody>
+      </p:sp>
+    </p:spTree>
+    <p:extLst>
+      <p:ext uri="{BB962C8B-B14F-4D97-AF65-F5344CB8AC3E}">
+        <p14:creationId xmlns:p14="http://schemas.microsoft.com/office/powerpoint/2010/main" val="492578308"/>
       </p:ext>
     </p:extLst>
   </p:cSld>
@@ -6118,7 +7364,7 @@
             <a:pPr lvl="1"/>
             <a:r>
               <a:rPr lang="en-US" dirty="0"/>
-              <a:t>Census Bureau ACS reports</a:t>
+              <a:t>Census Bureau American Community Survey (ACS) reports</a:t>
             </a:r>
             <a:br>
               <a:rPr lang="en-US" dirty="0"/>
@@ -6146,6 +7392,9 @@
   <p:clrMapOvr>
     <a:masterClrMapping/>
   </p:clrMapOvr>
+  <p:transition spd="slow">
+    <p:wipe/>
+  </p:transition>
 </p:sld>
 </file>
 
@@ -6218,7 +7467,7 @@
         </p:spPr>
         <p:txBody>
           <a:bodyPr>
-            <a:normAutofit/>
+            <a:normAutofit lnSpcReduction="10000"/>
           </a:bodyPr>
           <a:lstStyle/>
           <a:p>
@@ -6262,7 +7511,17 @@
             </a:pPr>
             <a:r>
               <a:rPr lang="en-US" dirty="0"/>
-              <a:t>Focused on select types of incidents – top ten list</a:t>
+              <a:t>Focused on select types of incidents – </a:t>
+            </a:r>
+            <a:r>
+              <a:rPr lang="en-US" dirty="0">
+                <a:hlinkClick r:id="rId2" action="ppaction://hlinksldjump"/>
+              </a:rPr>
+              <a:t>top ten</a:t>
+            </a:r>
+            <a:r>
+              <a:rPr lang="en-US" dirty="0"/>
+              <a:t> list</a:t>
             </a:r>
           </a:p>
           <a:p>
@@ -6293,7 +7552,7 @@
             </a:r>
             <a:r>
               <a:rPr lang="en-US" dirty="0">
-                <a:hlinkClick r:id="rId2"/>
+                <a:hlinkClick r:id="rId3"/>
               </a:rPr>
               <a:t>http://ws.geonames.org</a:t>
             </a:r>
@@ -6330,15 +7589,14 @@
             <a:pPr lvl="1"/>
             <a:r>
               <a:rPr lang="en-US" dirty="0"/>
-              <a:t>Used shape, columns, statistics, duplicate, </a:t>
-            </a:r>
-            <a:r>
-              <a:rPr lang="en-US" dirty="0" err="1"/>
-              <a:t>dtypes</a:t>
-            </a:r>
-            <a:r>
-              <a:rPr lang="en-US" dirty="0"/>
-              <a:t> to examine data</a:t>
+              <a:t>Clean data – not many duplicates or missing fields</a:t>
+            </a:r>
+          </a:p>
+          <a:p>
+            <a:pPr lvl="1"/>
+            <a:r>
+              <a:rPr lang="en-US" dirty="0"/>
+              <a:t>Used shape, columns, statistics, dtypes to examine data</a:t>
             </a:r>
           </a:p>
         </p:txBody>
@@ -6353,6 +7611,9 @@
   <p:clrMapOvr>
     <a:masterClrMapping/>
   </p:clrMapOvr>
+  <p:transition spd="slow">
+    <p:wipe/>
+  </p:transition>
 </p:sld>
 </file>
 
@@ -6403,7 +7664,7 @@
           <a:p>
             <a:r>
               <a:rPr lang="en-US" sz="2800" dirty="0"/>
-              <a:t>approach, findings, follow-on work</a:t>
+              <a:t>Approach &amp; follow-on work</a:t>
             </a:r>
           </a:p>
         </p:txBody>
@@ -6432,7 +7693,7 @@
         </p:spPr>
         <p:txBody>
           <a:bodyPr>
-            <a:normAutofit lnSpcReduction="10000"/>
+            <a:normAutofit/>
           </a:bodyPr>
           <a:lstStyle/>
           <a:p>
@@ -6442,7 +7703,7 @@
             </a:pPr>
             <a:r>
               <a:rPr lang="en-US" dirty="0"/>
-              <a:t>Collaborative an iterative</a:t>
+              <a:t>Collaborative and iterative approach</a:t>
             </a:r>
           </a:p>
           <a:p>
@@ -6456,7 +7717,7 @@
             <a:pPr lvl="1"/>
             <a:r>
               <a:rPr lang="en-US" dirty="0"/>
-              <a:t>Code structure reflected the independent nature of questions</a:t>
+              <a:t>Code structure reflects the independent nature of questions</a:t>
             </a:r>
           </a:p>
           <a:p>
@@ -6465,6 +7726,12 @@
               <a:rPr lang="en-US" dirty="0"/>
               <a:t>Started high level, drilled down into details, focused on relevant areas of interest</a:t>
             </a:r>
+          </a:p>
+          <a:p>
+            <a:pPr marL="457200" lvl="1" indent="0">
+              <a:buNone/>
+            </a:pPr>
+            <a:endParaRPr lang="en-US" dirty="0"/>
           </a:p>
           <a:p>
             <a:pPr>
@@ -6473,72 +7740,28 @@
             </a:pPr>
             <a:r>
               <a:rPr lang="en-US" dirty="0"/>
-              <a:t>High level findings</a:t>
+              <a:t>What new areas would we explore, given more time?</a:t>
             </a:r>
           </a:p>
           <a:p>
             <a:pPr lvl="1"/>
             <a:r>
               <a:rPr lang="en-US" dirty="0"/>
-              <a:t>Overall increase in </a:t>
-            </a:r>
-            <a:r>
-              <a:rPr lang="en-US" dirty="0">
-                <a:hlinkClick r:id="rId2" action="ppaction://hlinksldjump"/>
-              </a:rPr>
-              <a:t>annual</a:t>
-            </a:r>
-            <a:r>
-              <a:rPr lang="en-US" dirty="0"/>
-              <a:t> incidents commensurate with population increase; fairly similar </a:t>
-            </a:r>
-            <a:r>
-              <a:rPr lang="en-US" dirty="0">
-                <a:hlinkClick r:id="rId3" action="ppaction://hlinksldjump"/>
-              </a:rPr>
-              <a:t>mix of incident</a:t>
-            </a:r>
-            <a:r>
-              <a:rPr lang="en-US" dirty="0"/>
-              <a:t> types for zip codes</a:t>
+              <a:t>Apply geospatial techniques to identify hot spots</a:t>
             </a:r>
           </a:p>
           <a:p>
             <a:pPr lvl="1"/>
             <a:r>
               <a:rPr lang="en-US" dirty="0"/>
-              <a:t>Additional insights by individual team members</a:t>
-            </a:r>
-          </a:p>
-          <a:p>
-            <a:pPr>
-              <a:buFont typeface="Wingdings" panose="05000000000000000000" pitchFamily="2" charset="2"/>
-              <a:buChar char="Ø"/>
-            </a:pPr>
-            <a:r>
-              <a:rPr lang="en-US" dirty="0"/>
-              <a:t>What new areas would we explore, given more time?</a:t>
+              <a:t>Use google API to relate hot spot info to landmarks – tourist attraction areas</a:t>
             </a:r>
           </a:p>
           <a:p>
             <a:pPr lvl="1"/>
             <a:r>
               <a:rPr lang="en-US" dirty="0"/>
-              <a:t>Map zip codes to neighborhoods</a:t>
-            </a:r>
-          </a:p>
-          <a:p>
-            <a:pPr lvl="1"/>
-            <a:r>
-              <a:rPr lang="en-US" dirty="0"/>
-              <a:t>Apply geospatial techniques to identify hot spots</a:t>
-            </a:r>
-          </a:p>
-          <a:p>
-            <a:pPr lvl="1"/>
-            <a:r>
-              <a:rPr lang="en-US" dirty="0"/>
-              <a:t>Use google API to relate hot spot info to landmarks – tourist attraction areas, schools</a:t>
+              <a:t>Map incident coordinates to neighborhoods</a:t>
             </a:r>
           </a:p>
         </p:txBody>
@@ -6553,6 +7776,9 @@
   <p:clrMapOvr>
     <a:masterClrMapping/>
   </p:clrMapOvr>
+  <p:transition spd="slow">
+    <p:wipe/>
+  </p:transition>
 </p:sld>
 </file>
 
@@ -6573,79 +7799,40 @@
           <a:chExt cx="0" cy="0"/>
         </a:xfrm>
       </p:grpSpPr>
-      <p:sp>
-        <p:nvSpPr>
-          <p:cNvPr id="2" name="Title 1">
+      <p:pic>
+        <p:nvPicPr>
+          <p:cNvPr id="4" name="Picture 3">
             <a:extLst>
               <a:ext uri="{FF2B5EF4-FFF2-40B4-BE49-F238E27FC236}">
-                <a16:creationId xmlns:a16="http://schemas.microsoft.com/office/drawing/2014/main" id="{20B63B72-83DE-49C0-B20C-340C860B24A1}"/>
+                <a16:creationId xmlns:a16="http://schemas.microsoft.com/office/drawing/2014/main" id="{EBA99682-B5CC-4B5C-A2EA-BB7DAA88DD2F}"/>
               </a:ext>
             </a:extLst>
           </p:cNvPr>
-          <p:cNvSpPr>
-            <a:spLocks noGrp="1"/>
-          </p:cNvSpPr>
-          <p:nvPr>
-            <p:ph type="title"/>
-          </p:nvPr>
-        </p:nvSpPr>
-        <p:spPr/>
-        <p:txBody>
-          <a:bodyPr/>
-          <a:lstStyle/>
-          <a:p>
-            <a:r>
-              <a:rPr lang="en-US" dirty="0"/>
-              <a:t>Individual slides</a:t>
-            </a:r>
-          </a:p>
-        </p:txBody>
-      </p:sp>
-      <p:sp>
-        <p:nvSpPr>
-          <p:cNvPr id="3" name="TextBox 2">
-            <a:extLst>
-              <a:ext uri="{FF2B5EF4-FFF2-40B4-BE49-F238E27FC236}">
-                <a16:creationId xmlns:a16="http://schemas.microsoft.com/office/drawing/2014/main" id="{F345DBEB-710A-4341-ABE3-EA3E938325B3}"/>
-              </a:ext>
-            </a:extLst>
-          </p:cNvPr>
-          <p:cNvSpPr txBox="1"/>
+          <p:cNvPicPr>
+            <a:picLocks noChangeAspect="1"/>
+          </p:cNvPicPr>
           <p:nvPr/>
-        </p:nvSpPr>
-        <p:spPr>
-          <a:xfrm>
-            <a:off x="4359349" y="3593805"/>
-            <a:ext cx="4830168" cy="646331"/>
+        </p:nvPicPr>
+        <p:blipFill>
+          <a:blip r:embed="rId2"/>
+          <a:stretch>
+            <a:fillRect/>
+          </a:stretch>
+        </p:blipFill>
+        <p:spPr>
+          <a:xfrm>
+            <a:off x="1381125" y="1314450"/>
+            <a:ext cx="9429750" cy="5543550"/>
           </a:xfrm>
           <a:prstGeom prst="rect">
             <a:avLst/>
           </a:prstGeom>
-          <a:noFill/>
-        </p:spPr>
-        <p:txBody>
-          <a:bodyPr wrap="none" rtlCol="0">
-            <a:spAutoFit/>
-          </a:bodyPr>
-          <a:lstStyle/>
-          <a:p>
-            <a:r>
-              <a:rPr lang="en-US" dirty="0"/>
-              <a:t>Screen shots of plots &amp; Jupyter notebooks</a:t>
-            </a:r>
-          </a:p>
-          <a:p>
-            <a:r>
-              <a:rPr lang="en-US" dirty="0"/>
-              <a:t>2-4 slides per person</a:t>
-            </a:r>
-          </a:p>
-        </p:txBody>
-      </p:sp>
+        </p:spPr>
+      </p:pic>
     </p:spTree>
     <p:extLst>
       <p:ext uri="{BB962C8B-B14F-4D97-AF65-F5344CB8AC3E}">
-        <p14:creationId xmlns:p14="http://schemas.microsoft.com/office/powerpoint/2010/main" val="575706312"/>
+        <p14:creationId xmlns:p14="http://schemas.microsoft.com/office/powerpoint/2010/main" val="454325424"/>
       </p:ext>
     </p:extLst>
   </p:cSld>
@@ -6674,10 +7861,10 @@
       </p:grpSpPr>
       <p:pic>
         <p:nvPicPr>
-          <p:cNvPr id="7" name="Picture 6">
+          <p:cNvPr id="4" name="Picture 3">
             <a:extLst>
               <a:ext uri="{FF2B5EF4-FFF2-40B4-BE49-F238E27FC236}">
-                <a16:creationId xmlns:a16="http://schemas.microsoft.com/office/drawing/2014/main" id="{549E3E99-1CF1-4602-B15B-F77432084CF0}"/>
+                <a16:creationId xmlns:a16="http://schemas.microsoft.com/office/drawing/2014/main" id="{EDC2A94E-F0A6-4A75-8D8C-1CC41818D02F}"/>
               </a:ext>
             </a:extLst>
           </p:cNvPr>
@@ -6694,84 +7881,83 @@
         </p:blipFill>
         <p:spPr>
           <a:xfrm>
-            <a:off x="685801" y="1064870"/>
-            <a:ext cx="10387360" cy="5793129"/>
+            <a:off x="0" y="2125563"/>
+            <a:ext cx="5487650" cy="3658433"/>
           </a:xfrm>
           <a:prstGeom prst="rect">
             <a:avLst/>
           </a:prstGeom>
         </p:spPr>
       </p:pic>
-      <p:sp>
-        <p:nvSpPr>
-          <p:cNvPr id="2" name="Title 1">
+      <p:pic>
+        <p:nvPicPr>
+          <p:cNvPr id="6" name="Picture 5">
             <a:extLst>
               <a:ext uri="{FF2B5EF4-FFF2-40B4-BE49-F238E27FC236}">
-                <a16:creationId xmlns:a16="http://schemas.microsoft.com/office/drawing/2014/main" id="{409242EF-09D9-45D9-A780-4484C9E72F5B}"/>
+                <a16:creationId xmlns:a16="http://schemas.microsoft.com/office/drawing/2014/main" id="{A728A8CF-F5CF-4E1F-B90C-A1C829AE8FD7}"/>
               </a:ext>
             </a:extLst>
           </p:cNvPr>
-          <p:cNvSpPr>
-            <a:spLocks noGrp="1"/>
-          </p:cNvSpPr>
-          <p:nvPr>
-            <p:ph type="title"/>
-          </p:nvPr>
-        </p:nvSpPr>
-        <p:spPr/>
-        <p:txBody>
-          <a:bodyPr/>
-          <a:lstStyle/>
-          <a:p>
-            <a:r>
-              <a:rPr lang="en-US" dirty="0"/>
-              <a:t>Annual pattern</a:t>
-            </a:r>
-          </a:p>
-        </p:txBody>
-      </p:sp>
-      <p:sp>
-        <p:nvSpPr>
-          <p:cNvPr id="5" name="TextBox 4">
+          <p:cNvPicPr>
+            <a:picLocks noChangeAspect="1"/>
+          </p:cNvPicPr>
+          <p:nvPr/>
+        </p:nvPicPr>
+        <p:blipFill>
+          <a:blip r:embed="rId3"/>
+          <a:stretch>
+            <a:fillRect/>
+          </a:stretch>
+        </p:blipFill>
+        <p:spPr>
+          <a:xfrm>
+            <a:off x="6278880" y="2125563"/>
+            <a:ext cx="5487650" cy="3658433"/>
+          </a:xfrm>
+          <a:prstGeom prst="rect">
+            <a:avLst/>
+          </a:prstGeom>
+        </p:spPr>
+      </p:pic>
+      <p:sp>
+        <p:nvSpPr>
+          <p:cNvPr id="7" name="Title 1">
             <a:extLst>
               <a:ext uri="{FF2B5EF4-FFF2-40B4-BE49-F238E27FC236}">
-                <a16:creationId xmlns:a16="http://schemas.microsoft.com/office/drawing/2014/main" id="{DFBD5A09-1EED-4DFD-A21D-C5CEED9528BC}"/>
+                <a16:creationId xmlns:a16="http://schemas.microsoft.com/office/drawing/2014/main" id="{C11CF72E-8CEB-413B-95E8-4D03084317E2}"/>
               </a:ext>
             </a:extLst>
           </p:cNvPr>
-          <p:cNvSpPr txBox="1"/>
-          <p:nvPr/>
-        </p:nvSpPr>
-        <p:spPr>
-          <a:xfrm>
-            <a:off x="11073161" y="6434254"/>
-            <a:ext cx="813043" cy="369332"/>
-          </a:xfrm>
-          <a:prstGeom prst="rect">
-            <a:avLst/>
-          </a:prstGeom>
-          <a:noFill/>
-        </p:spPr>
-        <p:txBody>
-          <a:bodyPr wrap="none" rtlCol="0">
-            <a:spAutoFit/>
+          <p:cNvSpPr>
+            <a:spLocks noGrp="1"/>
+          </p:cNvSpPr>
+          <p:nvPr>
+            <p:ph type="title"/>
+          </p:nvPr>
+        </p:nvSpPr>
+        <p:spPr>
+          <a:xfrm>
+            <a:off x="2895600" y="764373"/>
+            <a:ext cx="8610600" cy="1293028"/>
+          </a:xfrm>
+        </p:spPr>
+        <p:txBody>
+          <a:bodyPr>
+            <a:normAutofit/>
           </a:bodyPr>
           <a:lstStyle/>
           <a:p>
             <a:r>
-              <a:rPr lang="en-US" dirty="0">
-                <a:hlinkClick r:id="rId3" action="ppaction://hlinksldjump"/>
-              </a:rPr>
-              <a:t>BACK</a:t>
-            </a:r>
-            <a:endParaRPr lang="en-US" dirty="0"/>
+              <a:rPr lang="en-US" sz="3200" dirty="0"/>
+              <a:t>Top 10 Incident mix pattern over time</a:t>
+            </a:r>
           </a:p>
         </p:txBody>
       </p:sp>
     </p:spTree>
     <p:extLst>
       <p:ext uri="{BB962C8B-B14F-4D97-AF65-F5344CB8AC3E}">
-        <p14:creationId xmlns:p14="http://schemas.microsoft.com/office/powerpoint/2010/main" val="2416671547"/>
+        <p14:creationId xmlns:p14="http://schemas.microsoft.com/office/powerpoint/2010/main" val="2154975662"/>
       </p:ext>
     </p:extLst>
   </p:cSld>
@@ -6782,6 +7968,104 @@
 </file>
 
 <file path=ppt/slides/slide7.xml><?xml version="1.0" encoding="utf-8"?>
+<p:sld xmlns:a="http://schemas.openxmlformats.org/drawingml/2006/main" xmlns:r="http://schemas.openxmlformats.org/officeDocument/2006/relationships" xmlns:p="http://schemas.openxmlformats.org/presentationml/2006/main">
+  <p:cSld>
+    <p:spTree>
+      <p:nvGrpSpPr>
+        <p:cNvPr id="1" name=""/>
+        <p:cNvGrpSpPr/>
+        <p:nvPr/>
+      </p:nvGrpSpPr>
+      <p:grpSpPr>
+        <a:xfrm>
+          <a:off x="0" y="0"/>
+          <a:ext cx="0" cy="0"/>
+          <a:chOff x="0" y="0"/>
+          <a:chExt cx="0" cy="0"/>
+        </a:xfrm>
+      </p:grpSpPr>
+      <p:pic>
+        <p:nvPicPr>
+          <p:cNvPr id="4" name="Picture 3">
+            <a:extLst>
+              <a:ext uri="{FF2B5EF4-FFF2-40B4-BE49-F238E27FC236}">
+                <a16:creationId xmlns:a16="http://schemas.microsoft.com/office/drawing/2014/main" id="{8A245573-B117-4E79-B396-5122E6D5D9AA}"/>
+              </a:ext>
+            </a:extLst>
+          </p:cNvPr>
+          <p:cNvPicPr>
+            <a:picLocks noChangeAspect="1"/>
+          </p:cNvPicPr>
+          <p:nvPr/>
+        </p:nvPicPr>
+        <p:blipFill>
+          <a:blip r:embed="rId2"/>
+          <a:stretch>
+            <a:fillRect/>
+          </a:stretch>
+        </p:blipFill>
+        <p:spPr>
+          <a:xfrm>
+            <a:off x="2667000" y="1017270"/>
+            <a:ext cx="6858000" cy="5840730"/>
+          </a:xfrm>
+          <a:prstGeom prst="rect">
+            <a:avLst/>
+          </a:prstGeom>
+        </p:spPr>
+      </p:pic>
+      <p:sp>
+        <p:nvSpPr>
+          <p:cNvPr id="2" name="Title 1">
+            <a:extLst>
+              <a:ext uri="{FF2B5EF4-FFF2-40B4-BE49-F238E27FC236}">
+                <a16:creationId xmlns:a16="http://schemas.microsoft.com/office/drawing/2014/main" id="{409242EF-09D9-45D9-A780-4484C9E72F5B}"/>
+              </a:ext>
+            </a:extLst>
+          </p:cNvPr>
+          <p:cNvSpPr>
+            <a:spLocks noGrp="1"/>
+          </p:cNvSpPr>
+          <p:nvPr>
+            <p:ph type="title"/>
+          </p:nvPr>
+        </p:nvSpPr>
+        <p:spPr>
+          <a:xfrm>
+            <a:off x="3601505" y="307028"/>
+            <a:ext cx="8610600" cy="1293028"/>
+          </a:xfrm>
+        </p:spPr>
+        <p:txBody>
+          <a:bodyPr>
+            <a:normAutofit/>
+          </a:bodyPr>
+          <a:lstStyle/>
+          <a:p>
+            <a:r>
+              <a:rPr lang="en-US" sz="3600" dirty="0"/>
+              <a:t>Annual pattern at zip code level</a:t>
+            </a:r>
+          </a:p>
+        </p:txBody>
+      </p:sp>
+    </p:spTree>
+    <p:extLst>
+      <p:ext uri="{BB962C8B-B14F-4D97-AF65-F5344CB8AC3E}">
+        <p14:creationId xmlns:p14="http://schemas.microsoft.com/office/powerpoint/2010/main" val="3677828481"/>
+      </p:ext>
+    </p:extLst>
+  </p:cSld>
+  <p:clrMapOvr>
+    <a:masterClrMapping/>
+  </p:clrMapOvr>
+  <p:transition spd="slow">
+    <p:wipe/>
+  </p:transition>
+</p:sld>
+</file>
+
+<file path=ppt/slides/slide8.xml><?xml version="1.0" encoding="utf-8"?>
 <p:sld xmlns:a="http://schemas.openxmlformats.org/drawingml/2006/main" xmlns:r="http://schemas.openxmlformats.org/officeDocument/2006/relationships" xmlns:p="http://schemas.openxmlformats.org/presentationml/2006/main">
   <p:cSld>
     <p:spTree>
@@ -6844,53 +8128,22 @@
             <p:ph type="title"/>
           </p:nvPr>
         </p:nvSpPr>
-        <p:spPr/>
-        <p:txBody>
-          <a:bodyPr/>
-          <a:lstStyle/>
-          <a:p>
-            <a:r>
-              <a:rPr lang="en-US" dirty="0"/>
-              <a:t>Incident mix pattern</a:t>
-            </a:r>
-          </a:p>
-        </p:txBody>
-      </p:sp>
-      <p:sp>
-        <p:nvSpPr>
-          <p:cNvPr id="5" name="TextBox 4">
-            <a:extLst>
-              <a:ext uri="{FF2B5EF4-FFF2-40B4-BE49-F238E27FC236}">
-                <a16:creationId xmlns:a16="http://schemas.microsoft.com/office/drawing/2014/main" id="{9CA8CC4E-9CA9-4B1D-AC49-0271FB8DEA90}"/>
-              </a:ext>
-            </a:extLst>
-          </p:cNvPr>
-          <p:cNvSpPr txBox="1"/>
-          <p:nvPr/>
-        </p:nvSpPr>
-        <p:spPr>
-          <a:xfrm>
-            <a:off x="11389483" y="6504968"/>
-            <a:ext cx="813043" cy="369332"/>
-          </a:xfrm>
-          <a:prstGeom prst="rect">
-            <a:avLst/>
-          </a:prstGeom>
-          <a:noFill/>
-        </p:spPr>
-        <p:txBody>
-          <a:bodyPr wrap="none" rtlCol="0">
-            <a:spAutoFit/>
+        <p:spPr>
+          <a:xfrm>
+            <a:off x="2895600" y="405557"/>
+            <a:ext cx="8610600" cy="1293028"/>
+          </a:xfrm>
+        </p:spPr>
+        <p:txBody>
+          <a:bodyPr>
+            <a:normAutofit/>
           </a:bodyPr>
           <a:lstStyle/>
           <a:p>
             <a:r>
-              <a:rPr lang="en-US" dirty="0">
-                <a:hlinkClick r:id="rId3" action="ppaction://hlinksldjump"/>
-              </a:rPr>
-              <a:t>BACK</a:t>
-            </a:r>
-            <a:endParaRPr lang="en-US" dirty="0"/>
+              <a:rPr lang="en-US" sz="3600" dirty="0"/>
+              <a:t>Incident mix pattern</a:t>
+            </a:r>
           </a:p>
         </p:txBody>
       </p:sp>
@@ -6898,6 +8151,121 @@
     <p:extLst>
       <p:ext uri="{BB962C8B-B14F-4D97-AF65-F5344CB8AC3E}">
         <p14:creationId xmlns:p14="http://schemas.microsoft.com/office/powerpoint/2010/main" val="3315800758"/>
+      </p:ext>
+    </p:extLst>
+  </p:cSld>
+  <p:clrMapOvr>
+    <a:masterClrMapping/>
+  </p:clrMapOvr>
+  <p:transition spd="slow">
+    <p:wipe/>
+  </p:transition>
+</p:sld>
+</file>
+
+<file path=ppt/slides/slide9.xml><?xml version="1.0" encoding="utf-8"?>
+<p:sld xmlns:a="http://schemas.openxmlformats.org/drawingml/2006/main" xmlns:r="http://schemas.openxmlformats.org/officeDocument/2006/relationships" xmlns:p="http://schemas.openxmlformats.org/presentationml/2006/main">
+  <p:cSld>
+    <p:spTree>
+      <p:nvGrpSpPr>
+        <p:cNvPr id="1" name=""/>
+        <p:cNvGrpSpPr/>
+        <p:nvPr/>
+      </p:nvGrpSpPr>
+      <p:grpSpPr>
+        <a:xfrm>
+          <a:off x="0" y="0"/>
+          <a:ext cx="0" cy="0"/>
+          <a:chOff x="0" y="0"/>
+          <a:chExt cx="0" cy="0"/>
+        </a:xfrm>
+      </p:grpSpPr>
+      <p:pic>
+        <p:nvPicPr>
+          <p:cNvPr id="3" name="Picture 2">
+            <a:extLst>
+              <a:ext uri="{FF2B5EF4-FFF2-40B4-BE49-F238E27FC236}">
+                <a16:creationId xmlns:a16="http://schemas.microsoft.com/office/drawing/2014/main" id="{BD04C3B4-92B0-410E-B9D2-A86B817FB8E7}"/>
+              </a:ext>
+            </a:extLst>
+          </p:cNvPr>
+          <p:cNvPicPr>
+            <a:picLocks noChangeAspect="1"/>
+          </p:cNvPicPr>
+          <p:nvPr/>
+        </p:nvPicPr>
+        <p:blipFill>
+          <a:blip r:embed="rId2"/>
+          <a:stretch>
+            <a:fillRect/>
+          </a:stretch>
+        </p:blipFill>
+        <p:spPr>
+          <a:xfrm>
+            <a:off x="2351840" y="1671195"/>
+            <a:ext cx="7785500" cy="4864350"/>
+          </a:xfrm>
+          <a:prstGeom prst="rect">
+            <a:avLst/>
+          </a:prstGeom>
+        </p:spPr>
+      </p:pic>
+      <p:sp>
+        <p:nvSpPr>
+          <p:cNvPr id="4" name="Title 1">
+            <a:extLst>
+              <a:ext uri="{FF2B5EF4-FFF2-40B4-BE49-F238E27FC236}">
+                <a16:creationId xmlns:a16="http://schemas.microsoft.com/office/drawing/2014/main" id="{22F89153-5E13-4BC5-A0BA-8C4F0CC37844}"/>
+              </a:ext>
+            </a:extLst>
+          </p:cNvPr>
+          <p:cNvSpPr txBox="1">
+            <a:spLocks/>
+          </p:cNvSpPr>
+          <p:nvPr/>
+        </p:nvSpPr>
+        <p:spPr>
+          <a:xfrm>
+            <a:off x="3398520" y="695793"/>
+            <a:ext cx="8610600" cy="1293028"/>
+          </a:xfrm>
+          <a:prstGeom prst="rect">
+            <a:avLst/>
+          </a:prstGeom>
+        </p:spPr>
+        <p:txBody>
+          <a:bodyPr/>
+          <a:lstStyle>
+            <a:lvl1pPr algn="r" defTabSz="914400" rtl="0" eaLnBrk="1" latinLnBrk="0" hangingPunct="1">
+              <a:lnSpc>
+                <a:spcPct val="90000"/>
+              </a:lnSpc>
+              <a:spcBef>
+                <a:spcPct val="0"/>
+              </a:spcBef>
+              <a:buNone/>
+              <a:defRPr sz="4000" kern="1200" cap="all" baseline="0">
+                <a:solidFill>
+                  <a:schemeClr val="tx1"/>
+                </a:solidFill>
+                <a:latin typeface="+mj-lt"/>
+                <a:ea typeface="+mj-ea"/>
+                <a:cs typeface="+mj-cs"/>
+              </a:defRPr>
+            </a:lvl1pPr>
+          </a:lstStyle>
+          <a:p>
+            <a:r>
+              <a:rPr lang="en-US" dirty="0"/>
+              <a:t>Day of week &amp; crime incidents</a:t>
+            </a:r>
+          </a:p>
+        </p:txBody>
+      </p:sp>
+    </p:spTree>
+    <p:extLst>
+      <p:ext uri="{BB962C8B-B14F-4D97-AF65-F5344CB8AC3E}">
+        <p14:creationId xmlns:p14="http://schemas.microsoft.com/office/powerpoint/2010/main" val="3526132719"/>
       </p:ext>
     </p:extLst>
   </p:cSld>

</xml_diff>

<commit_message>
Added a slide and tweaked few others
</commit_message>
<xml_diff>
--- a/Presentation.pptx
+++ b/Presentation.pptx
@@ -5,7 +5,7 @@
     <p:sldMasterId id="2147483648" r:id="rId1"/>
   </p:sldMasterIdLst>
   <p:handoutMasterIdLst>
-    <p:handoutMasterId r:id="rId20"/>
+    <p:handoutMasterId r:id="rId21"/>
   </p:handoutMasterIdLst>
   <p:sldIdLst>
     <p:sldId id="256" r:id="rId2"/>
@@ -26,6 +26,7 @@
     <p:sldId id="264" r:id="rId17"/>
     <p:sldId id="271" r:id="rId18"/>
     <p:sldId id="265" r:id="rId19"/>
+    <p:sldId id="278" r:id="rId20"/>
   </p:sldIdLst>
   <p:sldSz cx="12192000" cy="6858000"/>
   <p:notesSz cx="7010400" cy="9296400"/>
@@ -132,10 +133,6 @@
 </p:presentation>
 </file>
 
-<file path=ppt/revisionInfo.xml><?xml version="1.0" encoding="utf-8"?>
-<p1510:revInfo xmlns:a="http://schemas.openxmlformats.org/drawingml/2006/main" xmlns:r="http://schemas.openxmlformats.org/officeDocument/2006/relationships" xmlns:p1510="http://schemas.microsoft.com/office/powerpoint/2015/10/main"/>
-</file>
-
 <file path=ppt/handoutMasters/handoutMaster1.xml><?xml version="1.0" encoding="utf-8"?>
 <p:handoutMaster xmlns:a="http://schemas.openxmlformats.org/drawingml/2006/main" xmlns:r="http://schemas.openxmlformats.org/officeDocument/2006/relationships" xmlns:p="http://schemas.openxmlformats.org/presentationml/2006/main">
   <p:cSld>
@@ -230,7 +227,7 @@
           <a:p>
             <a:fld id="{3CF7F9E4-3780-4D43-A3C2-4336D1E02782}" type="datetimeFigureOut">
               <a:rPr lang="en-US" smtClean="0"/>
-              <a:t>1/19/2018</a:t>
+              <a:t>1/20/2018</a:t>
             </a:fld>
             <a:endParaRPr lang="en-US" dirty="0"/>
           </a:p>
@@ -495,7 +492,7 @@
           <a:p>
             <a:fld id="{48A87A34-81AB-432B-8DAE-1953F412C126}" type="datetimeFigureOut">
               <a:rPr lang="en-US" dirty="0"/>
-              <a:t>1/19/2018</a:t>
+              <a:t>1/20/2018</a:t>
             </a:fld>
             <a:endParaRPr lang="en-US" dirty="0"/>
           </a:p>
@@ -756,7 +753,7 @@
           <a:p>
             <a:fld id="{48A87A34-81AB-432B-8DAE-1953F412C126}" type="datetimeFigureOut">
               <a:rPr lang="en-US" dirty="0"/>
-              <a:t>1/19/2018</a:t>
+              <a:t>1/20/2018</a:t>
             </a:fld>
             <a:endParaRPr lang="en-US" dirty="0"/>
           </a:p>
@@ -983,7 +980,7 @@
             <a:fld id="{48A87A34-81AB-432B-8DAE-1953F412C126}" type="datetimeFigureOut">
               <a:rPr lang="en-US" dirty="0"/>
               <a:pPr/>
-              <a:t>1/19/2018</a:t>
+              <a:t>1/20/2018</a:t>
             </a:fld>
             <a:endParaRPr lang="en-US" dirty="0"/>
           </a:p>
@@ -1289,7 +1286,7 @@
             <a:fld id="{48A87A34-81AB-432B-8DAE-1953F412C126}" type="datetimeFigureOut">
               <a:rPr lang="en-US" dirty="0"/>
               <a:pPr/>
-              <a:t>1/19/2018</a:t>
+              <a:t>1/20/2018</a:t>
             </a:fld>
             <a:endParaRPr lang="en-US" dirty="0"/>
           </a:p>
@@ -1758,7 +1755,7 @@
             <a:fld id="{48A87A34-81AB-432B-8DAE-1953F412C126}" type="datetimeFigureOut">
               <a:rPr lang="en-US" dirty="0"/>
               <a:pPr/>
-              <a:t>1/19/2018</a:t>
+              <a:t>1/20/2018</a:t>
             </a:fld>
             <a:endParaRPr lang="en-US" dirty="0"/>
           </a:p>
@@ -2300,7 +2297,7 @@
           <a:p>
             <a:fld id="{48A87A34-81AB-432B-8DAE-1953F412C126}" type="datetimeFigureOut">
               <a:rPr lang="en-US" dirty="0"/>
-              <a:t>1/19/2018</a:t>
+              <a:t>1/20/2018</a:t>
             </a:fld>
             <a:endParaRPr lang="en-US" dirty="0"/>
           </a:p>
@@ -3066,7 +3063,7 @@
           <a:p>
             <a:fld id="{48A87A34-81AB-432B-8DAE-1953F412C126}" type="datetimeFigureOut">
               <a:rPr lang="en-US" dirty="0"/>
-              <a:t>1/19/2018</a:t>
+              <a:t>1/20/2018</a:t>
             </a:fld>
             <a:endParaRPr lang="en-US" dirty="0"/>
           </a:p>
@@ -3236,7 +3233,7 @@
           <a:p>
             <a:fld id="{48A87A34-81AB-432B-8DAE-1953F412C126}" type="datetimeFigureOut">
               <a:rPr lang="en-US" dirty="0"/>
-              <a:t>1/19/2018</a:t>
+              <a:t>1/20/2018</a:t>
             </a:fld>
             <a:endParaRPr lang="en-US" dirty="0"/>
           </a:p>
@@ -3455,7 +3452,7 @@
             <a:fld id="{48A87A34-81AB-432B-8DAE-1953F412C126}" type="datetimeFigureOut">
               <a:rPr lang="en-US" dirty="0"/>
               <a:pPr/>
-              <a:t>1/19/2018</a:t>
+              <a:t>1/20/2018</a:t>
             </a:fld>
             <a:endParaRPr lang="en-US" dirty="0"/>
           </a:p>
@@ -3630,7 +3627,7 @@
           <a:p>
             <a:fld id="{48A87A34-81AB-432B-8DAE-1953F412C126}" type="datetimeFigureOut">
               <a:rPr lang="en-US" dirty="0"/>
-              <a:t>1/19/2018</a:t>
+              <a:t>1/20/2018</a:t>
             </a:fld>
             <a:endParaRPr lang="en-US" dirty="0"/>
           </a:p>
@@ -3915,7 +3912,7 @@
             <a:fld id="{48A87A34-81AB-432B-8DAE-1953F412C126}" type="datetimeFigureOut">
               <a:rPr lang="en-US" dirty="0"/>
               <a:pPr/>
-              <a:t>1/19/2018</a:t>
+              <a:t>1/20/2018</a:t>
             </a:fld>
             <a:endParaRPr lang="en-US" dirty="0"/>
           </a:p>
@@ -4152,7 +4149,7 @@
           <a:p>
             <a:fld id="{48A87A34-81AB-432B-8DAE-1953F412C126}" type="datetimeFigureOut">
               <a:rPr lang="en-US" dirty="0"/>
-              <a:t>1/19/2018</a:t>
+              <a:t>1/20/2018</a:t>
             </a:fld>
             <a:endParaRPr lang="en-US" dirty="0"/>
           </a:p>
@@ -4526,7 +4523,7 @@
           <a:p>
             <a:fld id="{48A87A34-81AB-432B-8DAE-1953F412C126}" type="datetimeFigureOut">
               <a:rPr lang="en-US" dirty="0"/>
-              <a:t>1/19/2018</a:t>
+              <a:t>1/20/2018</a:t>
             </a:fld>
             <a:endParaRPr lang="en-US" dirty="0"/>
           </a:p>
@@ -4639,7 +4636,7 @@
           <a:p>
             <a:fld id="{48A87A34-81AB-432B-8DAE-1953F412C126}" type="datetimeFigureOut">
               <a:rPr lang="en-US" dirty="0"/>
-              <a:t>1/19/2018</a:t>
+              <a:t>1/20/2018</a:t>
             </a:fld>
             <a:endParaRPr lang="en-US" dirty="0"/>
           </a:p>
@@ -4729,7 +4726,7 @@
           <a:p>
             <a:fld id="{48A87A34-81AB-432B-8DAE-1953F412C126}" type="datetimeFigureOut">
               <a:rPr lang="en-US" dirty="0"/>
-              <a:t>1/19/2018</a:t>
+              <a:t>1/20/2018</a:t>
             </a:fld>
             <a:endParaRPr lang="en-US" dirty="0"/>
           </a:p>
@@ -4973,7 +4970,7 @@
           <a:p>
             <a:fld id="{48A87A34-81AB-432B-8DAE-1953F412C126}" type="datetimeFigureOut">
               <a:rPr lang="en-US" dirty="0"/>
-              <a:t>1/19/2018</a:t>
+              <a:t>1/20/2018</a:t>
             </a:fld>
             <a:endParaRPr lang="en-US" dirty="0"/>
           </a:p>
@@ -5224,7 +5221,7 @@
           <a:p>
             <a:fld id="{48A87A34-81AB-432B-8DAE-1953F412C126}" type="datetimeFigureOut">
               <a:rPr lang="en-US" dirty="0"/>
-              <a:t>1/19/2018</a:t>
+              <a:t>1/20/2018</a:t>
             </a:fld>
             <a:endParaRPr lang="en-US" dirty="0"/>
           </a:p>
@@ -5463,7 +5460,7 @@
             <a:fld id="{48A87A34-81AB-432B-8DAE-1953F412C126}" type="datetimeFigureOut">
               <a:rPr lang="en-US" dirty="0"/>
               <a:pPr/>
-              <a:t>1/19/2018</a:t>
+              <a:t>1/20/2018</a:t>
             </a:fld>
             <a:endParaRPr lang="en-US" dirty="0"/>
           </a:p>
@@ -5902,7 +5899,7 @@
               <a:rPr lang="en-US" sz="3600" dirty="0"/>
             </a:br>
             <a:r>
-              <a:rPr lang="en-US" sz="1400" dirty="0"/>
+              <a:rPr lang="en-US" sz="1600" dirty="0"/>
               <a:t>2010 through 2017</a:t>
             </a:r>
             <a:br>
@@ -7196,6 +7193,142 @@
 </p:sld>
 </file>
 
+<file path=ppt/slides/slide19.xml><?xml version="1.0" encoding="utf-8"?>
+<p:sld xmlns:a="http://schemas.openxmlformats.org/drawingml/2006/main" xmlns:r="http://schemas.openxmlformats.org/officeDocument/2006/relationships" xmlns:p="http://schemas.openxmlformats.org/presentationml/2006/main">
+  <p:cSld>
+    <p:spTree>
+      <p:nvGrpSpPr>
+        <p:cNvPr id="1" name=""/>
+        <p:cNvGrpSpPr/>
+        <p:nvPr/>
+      </p:nvGrpSpPr>
+      <p:grpSpPr>
+        <a:xfrm>
+          <a:off x="0" y="0"/>
+          <a:ext cx="0" cy="0"/>
+          <a:chOff x="0" y="0"/>
+          <a:chExt cx="0" cy="0"/>
+        </a:xfrm>
+      </p:grpSpPr>
+      <p:pic>
+        <p:nvPicPr>
+          <p:cNvPr id="4" name="Picture 3">
+            <a:extLst>
+              <a:ext uri="{FF2B5EF4-FFF2-40B4-BE49-F238E27FC236}">
+                <a16:creationId xmlns:a16="http://schemas.microsoft.com/office/drawing/2014/main" id="{77287DC2-A5C1-4241-BCA4-1C6D8FDEA65B}"/>
+              </a:ext>
+            </a:extLst>
+          </p:cNvPr>
+          <p:cNvPicPr>
+            <a:picLocks noChangeAspect="1"/>
+          </p:cNvPicPr>
+          <p:nvPr/>
+        </p:nvPicPr>
+        <p:blipFill>
+          <a:blip r:embed="rId2"/>
+          <a:stretch>
+            <a:fillRect/>
+          </a:stretch>
+        </p:blipFill>
+        <p:spPr>
+          <a:xfrm>
+            <a:off x="2667000" y="1048214"/>
+            <a:ext cx="6858000" cy="5809785"/>
+          </a:xfrm>
+          <a:prstGeom prst="rect">
+            <a:avLst/>
+          </a:prstGeom>
+        </p:spPr>
+      </p:pic>
+      <p:sp>
+        <p:nvSpPr>
+          <p:cNvPr id="2" name="Title 1">
+            <a:extLst>
+              <a:ext uri="{FF2B5EF4-FFF2-40B4-BE49-F238E27FC236}">
+                <a16:creationId xmlns:a16="http://schemas.microsoft.com/office/drawing/2014/main" id="{8A29C2BB-823E-4AC9-A7E4-F0662DB4BA50}"/>
+              </a:ext>
+            </a:extLst>
+          </p:cNvPr>
+          <p:cNvSpPr>
+            <a:spLocks noGrp="1"/>
+          </p:cNvSpPr>
+          <p:nvPr>
+            <p:ph type="title"/>
+          </p:nvPr>
+        </p:nvSpPr>
+        <p:spPr/>
+        <p:txBody>
+          <a:bodyPr>
+            <a:normAutofit/>
+          </a:bodyPr>
+          <a:lstStyle/>
+          <a:p>
+            <a:r>
+              <a:rPr lang="en-US" sz="3200" dirty="0"/>
+              <a:t>Top 13 categories of incidents</a:t>
+            </a:r>
+            <a:br>
+              <a:rPr lang="en-US" sz="3200" dirty="0"/>
+            </a:br>
+            <a:r>
+              <a:rPr lang="en-US" sz="2400" cap="none" dirty="0"/>
+              <a:t>by Count</a:t>
+            </a:r>
+            <a:endParaRPr lang="en-US" sz="3200" cap="none" dirty="0"/>
+          </a:p>
+        </p:txBody>
+      </p:sp>
+      <p:sp>
+        <p:nvSpPr>
+          <p:cNvPr id="9" name="TextBox 8">
+            <a:extLst>
+              <a:ext uri="{FF2B5EF4-FFF2-40B4-BE49-F238E27FC236}">
+                <a16:creationId xmlns:a16="http://schemas.microsoft.com/office/drawing/2014/main" id="{B9B0913B-D568-4F92-AC15-9A49D915E24B}"/>
+              </a:ext>
+            </a:extLst>
+          </p:cNvPr>
+          <p:cNvSpPr txBox="1"/>
+          <p:nvPr/>
+        </p:nvSpPr>
+        <p:spPr>
+          <a:xfrm>
+            <a:off x="10984230" y="6400800"/>
+            <a:ext cx="813043" cy="369332"/>
+          </a:xfrm>
+          <a:prstGeom prst="rect">
+            <a:avLst/>
+          </a:prstGeom>
+          <a:noFill/>
+        </p:spPr>
+        <p:txBody>
+          <a:bodyPr wrap="none" rtlCol="0">
+            <a:spAutoFit/>
+          </a:bodyPr>
+          <a:lstStyle/>
+          <a:p>
+            <a:r>
+              <a:rPr lang="en-US" dirty="0">
+                <a:hlinkClick r:id="rId3" action="ppaction://hlinksldjump"/>
+              </a:rPr>
+              <a:t>BACK</a:t>
+            </a:r>
+            <a:endParaRPr lang="en-US" dirty="0"/>
+          </a:p>
+        </p:txBody>
+      </p:sp>
+    </p:spTree>
+    <p:extLst>
+      <p:ext uri="{BB962C8B-B14F-4D97-AF65-F5344CB8AC3E}">
+        <p14:creationId xmlns:p14="http://schemas.microsoft.com/office/powerpoint/2010/main" val="2046400644"/>
+      </p:ext>
+    </p:extLst>
+  </p:cSld>
+  <p:clrMapOvr>
+    <a:masterClrMapping/>
+  </p:clrMapOvr>
+</p:sld>
+</file>
+
 <file path=ppt/slides/slide2.xml><?xml version="1.0" encoding="utf-8"?>
 <p:sld xmlns:a="http://schemas.openxmlformats.org/drawingml/2006/main" xmlns:r="http://schemas.openxmlformats.org/officeDocument/2006/relationships" xmlns:p="http://schemas.openxmlformats.org/presentationml/2006/main">
   <p:cSld>
@@ -7282,7 +7415,7 @@
             <a:pPr lvl="1"/>
             <a:r>
               <a:rPr lang="en-US" dirty="0"/>
-              <a:t>Investigate a relevant local topic</a:t>
+              <a:t>Investigate a relatable, relevant local topic</a:t>
             </a:r>
           </a:p>
           <a:p>
@@ -7575,7 +7708,7 @@
             </a:pPr>
             <a:r>
               <a:rPr lang="en-US" dirty="0"/>
-              <a:t>Data cleanup</a:t>
+              <a:t>Data sharing &amp; cleanup</a:t>
             </a:r>
           </a:p>
           <a:p>

</xml_diff>